<commit_message>
Start of defense slides
</commit_message>
<xml_diff>
--- a/BakalauroGynimas.pptx
+++ b/BakalauroGynimas.pptx
@@ -5,21 +5,17 @@
     <p:sldMasterId id="2147483648" r:id="rId1"/>
   </p:sldMasterIdLst>
   <p:notesMasterIdLst>
-    <p:notesMasterId r:id="rId14"/>
+    <p:notesMasterId r:id="rId10"/>
   </p:notesMasterIdLst>
   <p:sldIdLst>
     <p:sldId id="256" r:id="rId2"/>
     <p:sldId id="257" r:id="rId3"/>
-    <p:sldId id="258" r:id="rId4"/>
-    <p:sldId id="262" r:id="rId5"/>
-    <p:sldId id="279" r:id="rId6"/>
-    <p:sldId id="276" r:id="rId7"/>
-    <p:sldId id="277" r:id="rId8"/>
-    <p:sldId id="278" r:id="rId9"/>
-    <p:sldId id="271" r:id="rId10"/>
-    <p:sldId id="260" r:id="rId11"/>
-    <p:sldId id="261" r:id="rId12"/>
-    <p:sldId id="264" r:id="rId13"/>
+    <p:sldId id="280" r:id="rId4"/>
+    <p:sldId id="281" r:id="rId5"/>
+    <p:sldId id="282" r:id="rId6"/>
+    <p:sldId id="262" r:id="rId7"/>
+    <p:sldId id="261" r:id="rId8"/>
+    <p:sldId id="264" r:id="rId9"/>
   </p:sldIdLst>
   <p:sldSz cx="12192000" cy="6858000"/>
   <p:notesSz cx="6858000" cy="9144000"/>
@@ -220,7 +216,7 @@
           <a:p>
             <a:fld id="{A3DC8561-F39C-458D-BE45-6876C42FB601}" type="datetimeFigureOut">
               <a:rPr lang="lt-LT" smtClean="0"/>
-              <a:t>2018-04-22</a:t>
+              <a:t>2018-05-31</a:t>
             </a:fld>
             <a:endParaRPr lang="lt-LT"/>
           </a:p>
@@ -616,6 +612,10 @@
           <a:bodyPr/>
           <a:lstStyle/>
           <a:p>
+            <a:r>
+              <a:rPr lang="lt-LT" dirty="0" smtClean="0"/>
+              <a:t>Atributas - charakteristika, susieta su esybe (pvz. fiziniu asmeniu). Galimi fizinio asmens atributai: gimimo data, vardas, ūgis, pirštų antspaudai [Cam04]. Atributas gali būti laikinas (pvz. adresas) arba nuolatinis (pvz. asmens kodas).</a:t>
+            </a:r>
             <a:endParaRPr lang="lt-LT" dirty="0"/>
           </a:p>
         </p:txBody>
@@ -700,6 +700,40 @@
           <a:bodyPr/>
           <a:lstStyle/>
           <a:p>
+            <a:pPr marL="228600" indent="-228600">
+              <a:buAutoNum type="arabicParenR"/>
+            </a:pPr>
+            <a:r>
+              <a:rPr lang="lt-LT" dirty="0" smtClean="0"/>
+              <a:t>Nežino, kas naudoja;</a:t>
+            </a:r>
+            <a:r>
+              <a:rPr lang="lt-LT" baseline="0" dirty="0" smtClean="0"/>
+              <a:t> perklausimai vyksta tik naudojimo pradžioje (arba išvis neįvyksta)</a:t>
+            </a:r>
+          </a:p>
+          <a:p>
+            <a:pPr marL="228600" indent="-228600">
+              <a:buAutoNum type="arabicParenR"/>
+            </a:pPr>
+            <a:r>
+              <a:rPr lang="lt-LT" baseline="0" dirty="0" smtClean="0"/>
+              <a:t>Reikia kliautis, kad tapatybės ir paslaugų tiekėjai saugos patikimai, neperduos kam nereikia, nepakeis perdavimo taisyklių. Protokolų (Oauth, OpenIDConnect) realizacijos neretai palieka spragų</a:t>
+            </a:r>
+          </a:p>
+          <a:p>
+            <a:pPr marL="228600" indent="-228600">
+              <a:buAutoNum type="arabicParenR"/>
+            </a:pPr>
+            <a:r>
+              <a:rPr lang="lt-LT" baseline="0" dirty="0" smtClean="0"/>
+              <a:t>Turi keletą, single point of failure, sunku vienoj vietoj paimti ir pakeisti</a:t>
+            </a:r>
+          </a:p>
+          <a:p>
+            <a:pPr marL="228600" indent="-228600">
+              <a:buAutoNum type="arabicParenR"/>
+            </a:pPr>
             <a:endParaRPr lang="lt-LT" dirty="0"/>
           </a:p>
         </p:txBody>
@@ -721,7 +755,7 @@
           <a:p>
             <a:fld id="{88668DA6-77B8-42C8-BE73-474C424915DC}" type="slidenum">
               <a:rPr lang="lt-LT" smtClean="0"/>
-              <a:t>3</a:t>
+              <a:t>4</a:t>
             </a:fld>
             <a:endParaRPr lang="lt-LT"/>
           </a:p>
@@ -730,7 +764,7 @@
     </p:spTree>
     <p:extLst>
       <p:ext uri="{BB962C8B-B14F-4D97-AF65-F5344CB8AC3E}">
-        <p14:creationId xmlns:p14="http://schemas.microsoft.com/office/powerpoint/2010/main" val="1178855790"/>
+        <p14:creationId xmlns:p14="http://schemas.microsoft.com/office/powerpoint/2010/main" val="1857553011"/>
       </p:ext>
     </p:extLst>
   </p:cSld>
@@ -805,7 +839,7 @@
           <a:p>
             <a:fld id="{88668DA6-77B8-42C8-BE73-474C424915DC}" type="slidenum">
               <a:rPr lang="lt-LT" smtClean="0"/>
-              <a:t>4</a:t>
+              <a:t>6</a:t>
             </a:fld>
             <a:endParaRPr lang="lt-LT"/>
           </a:p>
@@ -868,6 +902,9 @@
           <a:bodyPr/>
           <a:lstStyle/>
           <a:p>
+            <a:pPr marL="0" indent="0">
+              <a:buNone/>
+            </a:pPr>
             <a:endParaRPr lang="lt-LT" dirty="0"/>
           </a:p>
         </p:txBody>
@@ -889,134 +926,7 @@
           <a:p>
             <a:fld id="{88668DA6-77B8-42C8-BE73-474C424915DC}" type="slidenum">
               <a:rPr lang="lt-LT" smtClean="0"/>
-              <a:t>5</a:t>
-            </a:fld>
-            <a:endParaRPr lang="lt-LT"/>
-          </a:p>
-        </p:txBody>
-      </p:sp>
-    </p:spTree>
-    <p:extLst>
-      <p:ext uri="{BB962C8B-B14F-4D97-AF65-F5344CB8AC3E}">
-        <p14:creationId xmlns:p14="http://schemas.microsoft.com/office/powerpoint/2010/main" val="246693615"/>
-      </p:ext>
-    </p:extLst>
-  </p:cSld>
-  <p:clrMapOvr>
-    <a:masterClrMapping/>
-  </p:clrMapOvr>
-</p:notes>
-</file>
-
-<file path=ppt/notesSlides/notesSlide6.xml><?xml version="1.0" encoding="utf-8"?>
-<p:notes xmlns:a="http://schemas.openxmlformats.org/drawingml/2006/main" xmlns:r="http://schemas.openxmlformats.org/officeDocument/2006/relationships" xmlns:p="http://schemas.openxmlformats.org/presentationml/2006/main">
-  <p:cSld>
-    <p:spTree>
-      <p:nvGrpSpPr>
-        <p:cNvPr id="1" name=""/>
-        <p:cNvGrpSpPr/>
-        <p:nvPr/>
-      </p:nvGrpSpPr>
-      <p:grpSpPr>
-        <a:xfrm>
-          <a:off x="0" y="0"/>
-          <a:ext cx="0" cy="0"/>
-          <a:chOff x="0" y="0"/>
-          <a:chExt cx="0" cy="0"/>
-        </a:xfrm>
-      </p:grpSpPr>
-      <p:sp>
-        <p:nvSpPr>
-          <p:cNvPr id="2" name="Slide Image Placeholder 1"/>
-          <p:cNvSpPr>
-            <a:spLocks noGrp="1" noRot="1" noChangeAspect="1"/>
-          </p:cNvSpPr>
-          <p:nvPr>
-            <p:ph type="sldImg"/>
-          </p:nvPr>
-        </p:nvSpPr>
-        <p:spPr/>
-      </p:sp>
-      <p:sp>
-        <p:nvSpPr>
-          <p:cNvPr id="3" name="Notes Placeholder 2"/>
-          <p:cNvSpPr>
-            <a:spLocks noGrp="1"/>
-          </p:cNvSpPr>
-          <p:nvPr>
-            <p:ph type="body" idx="1"/>
-          </p:nvPr>
-        </p:nvSpPr>
-        <p:spPr/>
-        <p:txBody>
-          <a:bodyPr/>
-          <a:lstStyle/>
-          <a:p>
-            <a:pPr marL="228600" indent="-228600">
-              <a:buAutoNum type="arabicParenR"/>
-            </a:pPr>
-            <a:r>
-              <a:rPr lang="lt-LT" dirty="0" smtClean="0"/>
-              <a:t>Komanda</a:t>
-            </a:r>
-            <a:r>
-              <a:rPr lang="lt-LT" baseline="0" dirty="0" smtClean="0"/>
-              <a:t> užsakovas &lt;-&gt; komanda kūrėjas</a:t>
-            </a:r>
-            <a:br>
-              <a:rPr lang="lt-LT" baseline="0" dirty="0" smtClean="0"/>
-            </a:br>
-            <a:r>
-              <a:rPr lang="lt-LT" baseline="0" dirty="0" smtClean="0"/>
-              <a:t>Komandos atsakingos už skirtingas sistemos dalis</a:t>
-            </a:r>
-          </a:p>
-          <a:p>
-            <a:pPr marL="228600" indent="-228600">
-              <a:buAutoNum type="arabicParenR"/>
-            </a:pPr>
-            <a:r>
-              <a:rPr lang="lt-LT" baseline="0" dirty="0" smtClean="0"/>
-              <a:t>SPA, Redux, CQRS</a:t>
-            </a:r>
-            <a:br>
-              <a:rPr lang="lt-LT" baseline="0" dirty="0" smtClean="0"/>
-            </a:br>
-            <a:r>
-              <a:rPr lang="lt-LT" baseline="0" dirty="0" smtClean="0"/>
-              <a:t>Skirtingų ekosistemų palyginimas</a:t>
-            </a:r>
-          </a:p>
-          <a:p>
-            <a:pPr marL="228600" indent="-228600">
-              <a:buAutoNum type="arabicParenR"/>
-            </a:pPr>
-            <a:r>
-              <a:rPr lang="lt-LT" baseline="0" dirty="0" smtClean="0"/>
-              <a:t>Kelias nuo kodo iki sistemos (commit, build, deploy), tam skirti įrankiai</a:t>
-            </a:r>
-            <a:endParaRPr lang="lt-LT" dirty="0"/>
-          </a:p>
-        </p:txBody>
-      </p:sp>
-      <p:sp>
-        <p:nvSpPr>
-          <p:cNvPr id="4" name="Slide Number Placeholder 3"/>
-          <p:cNvSpPr>
-            <a:spLocks noGrp="1"/>
-          </p:cNvSpPr>
-          <p:nvPr>
-            <p:ph type="sldNum" sz="quarter" idx="10"/>
-          </p:nvPr>
-        </p:nvSpPr>
-        <p:spPr/>
-        <p:txBody>
-          <a:bodyPr/>
-          <a:lstStyle/>
-          <a:p>
-            <a:fld id="{88668DA6-77B8-42C8-BE73-474C424915DC}" type="slidenum">
-              <a:rPr lang="lt-LT" smtClean="0"/>
-              <a:t>11</a:t>
+              <a:t>7</a:t>
             </a:fld>
             <a:endParaRPr lang="lt-LT"/>
           </a:p>
@@ -1174,7 +1084,7 @@
           <a:p>
             <a:fld id="{67C01686-024A-465C-9B0F-447ADBB397C9}" type="datetimeFigureOut">
               <a:rPr lang="lt-LT" smtClean="0"/>
-              <a:t>2018-04-22</a:t>
+              <a:t>2018-05-31</a:t>
             </a:fld>
             <a:endParaRPr lang="lt-LT"/>
           </a:p>
@@ -1344,7 +1254,7 @@
           <a:p>
             <a:fld id="{67C01686-024A-465C-9B0F-447ADBB397C9}" type="datetimeFigureOut">
               <a:rPr lang="lt-LT" smtClean="0"/>
-              <a:t>2018-04-22</a:t>
+              <a:t>2018-05-31</a:t>
             </a:fld>
             <a:endParaRPr lang="lt-LT"/>
           </a:p>
@@ -1524,7 +1434,7 @@
           <a:p>
             <a:fld id="{67C01686-024A-465C-9B0F-447ADBB397C9}" type="datetimeFigureOut">
               <a:rPr lang="lt-LT" smtClean="0"/>
-              <a:t>2018-04-22</a:t>
+              <a:t>2018-05-31</a:t>
             </a:fld>
             <a:endParaRPr lang="lt-LT"/>
           </a:p>
@@ -1694,7 +1604,7 @@
           <a:p>
             <a:fld id="{67C01686-024A-465C-9B0F-447ADBB397C9}" type="datetimeFigureOut">
               <a:rPr lang="lt-LT" smtClean="0"/>
-              <a:t>2018-04-22</a:t>
+              <a:t>2018-05-31</a:t>
             </a:fld>
             <a:endParaRPr lang="lt-LT"/>
           </a:p>
@@ -1940,7 +1850,7 @@
           <a:p>
             <a:fld id="{67C01686-024A-465C-9B0F-447ADBB397C9}" type="datetimeFigureOut">
               <a:rPr lang="lt-LT" smtClean="0"/>
-              <a:t>2018-04-22</a:t>
+              <a:t>2018-05-31</a:t>
             </a:fld>
             <a:endParaRPr lang="lt-LT"/>
           </a:p>
@@ -2172,7 +2082,7 @@
           <a:p>
             <a:fld id="{67C01686-024A-465C-9B0F-447ADBB397C9}" type="datetimeFigureOut">
               <a:rPr lang="lt-LT" smtClean="0"/>
-              <a:t>2018-04-22</a:t>
+              <a:t>2018-05-31</a:t>
             </a:fld>
             <a:endParaRPr lang="lt-LT"/>
           </a:p>
@@ -2539,7 +2449,7 @@
           <a:p>
             <a:fld id="{67C01686-024A-465C-9B0F-447ADBB397C9}" type="datetimeFigureOut">
               <a:rPr lang="lt-LT" smtClean="0"/>
-              <a:t>2018-04-22</a:t>
+              <a:t>2018-05-31</a:t>
             </a:fld>
             <a:endParaRPr lang="lt-LT"/>
           </a:p>
@@ -2657,7 +2567,7 @@
           <a:p>
             <a:fld id="{67C01686-024A-465C-9B0F-447ADBB397C9}" type="datetimeFigureOut">
               <a:rPr lang="lt-LT" smtClean="0"/>
-              <a:t>2018-04-22</a:t>
+              <a:t>2018-05-31</a:t>
             </a:fld>
             <a:endParaRPr lang="lt-LT"/>
           </a:p>
@@ -2752,7 +2662,7 @@
           <a:p>
             <a:fld id="{67C01686-024A-465C-9B0F-447ADBB397C9}" type="datetimeFigureOut">
               <a:rPr lang="lt-LT" smtClean="0"/>
-              <a:t>2018-04-22</a:t>
+              <a:t>2018-05-31</a:t>
             </a:fld>
             <a:endParaRPr lang="lt-LT"/>
           </a:p>
@@ -3029,7 +2939,7 @@
           <a:p>
             <a:fld id="{67C01686-024A-465C-9B0F-447ADBB397C9}" type="datetimeFigureOut">
               <a:rPr lang="lt-LT" smtClean="0"/>
-              <a:t>2018-04-22</a:t>
+              <a:t>2018-05-31</a:t>
             </a:fld>
             <a:endParaRPr lang="lt-LT"/>
           </a:p>
@@ -3282,7 +3192,7 @@
           <a:p>
             <a:fld id="{67C01686-024A-465C-9B0F-447ADBB397C9}" type="datetimeFigureOut">
               <a:rPr lang="lt-LT" smtClean="0"/>
-              <a:t>2018-04-22</a:t>
+              <a:t>2018-05-31</a:t>
             </a:fld>
             <a:endParaRPr lang="lt-LT"/>
           </a:p>
@@ -3495,7 +3405,7 @@
           <a:p>
             <a:fld id="{67C01686-024A-465C-9B0F-447ADBB397C9}" type="datetimeFigureOut">
               <a:rPr lang="lt-LT" smtClean="0"/>
-              <a:t>2018-04-22</a:t>
+              <a:t>2018-05-31</a:t>
             </a:fld>
             <a:endParaRPr lang="lt-LT"/>
           </a:p>
@@ -3942,567 +3852,495 @@
         </p:nvSpPr>
         <p:spPr/>
         <p:txBody>
-          <a:bodyPr/>
-          <a:lstStyle/>
-          <a:p>
-            <a:r>
-              <a:rPr lang="lt-LT" smtClean="0"/>
-              <a:t>Profesinė praktika</a:t>
+          <a:bodyPr>
+            <a:normAutofit/>
+          </a:bodyPr>
+          <a:lstStyle/>
+          <a:p>
+            <a:r>
+              <a:rPr lang="lt-LT" sz="4400" dirty="0" smtClean="0"/>
+              <a:t>Skaitmeninės tapatybės valdymas taikant blokų grandinę</a:t>
+            </a:r>
+            <a:endParaRPr lang="lt-LT" sz="4400" dirty="0"/>
+          </a:p>
+        </p:txBody>
+      </p:sp>
+      <p:sp>
+        <p:nvSpPr>
+          <p:cNvPr id="3" name="Subtitle 2"/>
+          <p:cNvSpPr>
+            <a:spLocks noGrp="1"/>
+          </p:cNvSpPr>
+          <p:nvPr>
+            <p:ph type="subTitle" idx="1"/>
+          </p:nvPr>
+        </p:nvSpPr>
+        <p:spPr/>
+        <p:txBody>
+          <a:bodyPr/>
+          <a:lstStyle/>
+          <a:p>
+            <a:r>
+              <a:rPr lang="lt-LT" dirty="0" smtClean="0"/>
+              <a:t>Bakalauro darbas</a:t>
             </a:r>
             <a:endParaRPr lang="lt-LT" dirty="0"/>
           </a:p>
         </p:txBody>
       </p:sp>
-      <p:sp>
-        <p:nvSpPr>
-          <p:cNvPr id="3" name="Subtitle 2"/>
-          <p:cNvSpPr>
-            <a:spLocks noGrp="1"/>
-          </p:cNvSpPr>
-          <p:nvPr>
-            <p:ph type="subTitle" idx="1"/>
-          </p:nvPr>
-        </p:nvSpPr>
-        <p:spPr/>
-        <p:txBody>
-          <a:bodyPr/>
-          <a:lstStyle/>
-          <a:p>
-            <a:r>
-              <a:rPr lang="lt-LT" dirty="0" smtClean="0"/>
-              <a:t>Vidinių įmonės užsakymų automatizavimo sistemos „TITO“ kūrimas</a:t>
-            </a:r>
-            <a:endParaRPr lang="lt-LT" dirty="0"/>
-          </a:p>
-        </p:txBody>
-      </p:sp>
-      <p:sp>
-        <p:nvSpPr>
-          <p:cNvPr id="4" name="Subtitle 2"/>
-          <p:cNvSpPr txBox="1">
-            <a:spLocks/>
-          </p:cNvSpPr>
+      <p:grpSp>
+        <p:nvGrpSpPr>
+          <p:cNvPr id="6" name="Group 5"/>
+          <p:cNvGrpSpPr/>
           <p:nvPr/>
-        </p:nvSpPr>
-        <p:spPr>
+        </p:nvGrpSpPr>
+        <p:grpSpPr>
           <a:xfrm>
             <a:off x="6785811" y="5349875"/>
-            <a:ext cx="5229726" cy="1419727"/>
+            <a:ext cx="5210246" cy="1257755"/>
+            <a:chOff x="6785811" y="5349875"/>
+            <a:chExt cx="5210246" cy="1257755"/>
           </a:xfrm>
-          <a:prstGeom prst="rect">
-            <a:avLst/>
-          </a:prstGeom>
-        </p:spPr>
-        <p:txBody>
-          <a:bodyPr vert="horz" lIns="91440" tIns="45720" rIns="91440" bIns="45720" rtlCol="0">
-            <a:normAutofit fontScale="92500"/>
-          </a:bodyPr>
-          <a:lstStyle>
-            <a:lvl1pPr marL="0" indent="0" algn="ctr" defTabSz="914400" rtl="0" eaLnBrk="1" latinLnBrk="0" hangingPunct="1">
-              <a:lnSpc>
-                <a:spcPct val="90000"/>
-              </a:lnSpc>
-              <a:spcBef>
-                <a:spcPts val="1000"/>
-              </a:spcBef>
-              <a:buFont typeface="Arial" panose="020B0604020202020204" pitchFamily="34" charset="0"/>
-              <a:buNone/>
-              <a:defRPr sz="2400" kern="1200">
-                <a:solidFill>
-                  <a:schemeClr val="tx1"/>
-                </a:solidFill>
-                <a:latin typeface="+mn-lt"/>
-                <a:ea typeface="+mn-ea"/>
-                <a:cs typeface="+mn-cs"/>
-              </a:defRPr>
-            </a:lvl1pPr>
-            <a:lvl2pPr marL="457200" indent="0" algn="ctr" defTabSz="914400" rtl="0" eaLnBrk="1" latinLnBrk="0" hangingPunct="1">
-              <a:lnSpc>
-                <a:spcPct val="90000"/>
-              </a:lnSpc>
-              <a:spcBef>
-                <a:spcPts val="500"/>
-              </a:spcBef>
-              <a:buFont typeface="Arial" panose="020B0604020202020204" pitchFamily="34" charset="0"/>
-              <a:buNone/>
-              <a:defRPr sz="2000" kern="1200">
-                <a:solidFill>
-                  <a:schemeClr val="tx1"/>
-                </a:solidFill>
-                <a:latin typeface="+mn-lt"/>
-                <a:ea typeface="+mn-ea"/>
-                <a:cs typeface="+mn-cs"/>
-              </a:defRPr>
-            </a:lvl2pPr>
-            <a:lvl3pPr marL="914400" indent="0" algn="ctr" defTabSz="914400" rtl="0" eaLnBrk="1" latinLnBrk="0" hangingPunct="1">
-              <a:lnSpc>
-                <a:spcPct val="90000"/>
-              </a:lnSpc>
-              <a:spcBef>
-                <a:spcPts val="500"/>
-              </a:spcBef>
-              <a:buFont typeface="Arial" panose="020B0604020202020204" pitchFamily="34" charset="0"/>
-              <a:buNone/>
-              <a:defRPr sz="1800" kern="1200">
-                <a:solidFill>
-                  <a:schemeClr val="tx1"/>
-                </a:solidFill>
-                <a:latin typeface="+mn-lt"/>
-                <a:ea typeface="+mn-ea"/>
-                <a:cs typeface="+mn-cs"/>
-              </a:defRPr>
-            </a:lvl3pPr>
-            <a:lvl4pPr marL="1371600" indent="0" algn="ctr" defTabSz="914400" rtl="0" eaLnBrk="1" latinLnBrk="0" hangingPunct="1">
-              <a:lnSpc>
-                <a:spcPct val="90000"/>
-              </a:lnSpc>
-              <a:spcBef>
-                <a:spcPts val="500"/>
-              </a:spcBef>
-              <a:buFont typeface="Arial" panose="020B0604020202020204" pitchFamily="34" charset="0"/>
-              <a:buNone/>
-              <a:defRPr sz="1600" kern="1200">
-                <a:solidFill>
-                  <a:schemeClr val="tx1"/>
-                </a:solidFill>
-                <a:latin typeface="+mn-lt"/>
-                <a:ea typeface="+mn-ea"/>
-                <a:cs typeface="+mn-cs"/>
-              </a:defRPr>
-            </a:lvl4pPr>
-            <a:lvl5pPr marL="1828800" indent="0" algn="ctr" defTabSz="914400" rtl="0" eaLnBrk="1" latinLnBrk="0" hangingPunct="1">
-              <a:lnSpc>
-                <a:spcPct val="90000"/>
-              </a:lnSpc>
-              <a:spcBef>
-                <a:spcPts val="500"/>
-              </a:spcBef>
-              <a:buFont typeface="Arial" panose="020B0604020202020204" pitchFamily="34" charset="0"/>
-              <a:buNone/>
-              <a:defRPr sz="1600" kern="1200">
-                <a:solidFill>
-                  <a:schemeClr val="tx1"/>
-                </a:solidFill>
-                <a:latin typeface="+mn-lt"/>
-                <a:ea typeface="+mn-ea"/>
-                <a:cs typeface="+mn-cs"/>
-              </a:defRPr>
-            </a:lvl5pPr>
-            <a:lvl6pPr marL="2286000" indent="0" algn="ctr" defTabSz="914400" rtl="0" eaLnBrk="1" latinLnBrk="0" hangingPunct="1">
-              <a:lnSpc>
-                <a:spcPct val="90000"/>
-              </a:lnSpc>
-              <a:spcBef>
-                <a:spcPts val="500"/>
-              </a:spcBef>
-              <a:buFont typeface="Arial" panose="020B0604020202020204" pitchFamily="34" charset="0"/>
-              <a:buNone/>
-              <a:defRPr sz="1600" kern="1200">
-                <a:solidFill>
-                  <a:schemeClr val="tx1"/>
-                </a:solidFill>
-                <a:latin typeface="+mn-lt"/>
-                <a:ea typeface="+mn-ea"/>
-                <a:cs typeface="+mn-cs"/>
-              </a:defRPr>
-            </a:lvl6pPr>
-            <a:lvl7pPr marL="2743200" indent="0" algn="ctr" defTabSz="914400" rtl="0" eaLnBrk="1" latinLnBrk="0" hangingPunct="1">
-              <a:lnSpc>
-                <a:spcPct val="90000"/>
-              </a:lnSpc>
-              <a:spcBef>
-                <a:spcPts val="500"/>
-              </a:spcBef>
-              <a:buFont typeface="Arial" panose="020B0604020202020204" pitchFamily="34" charset="0"/>
-              <a:buNone/>
-              <a:defRPr sz="1600" kern="1200">
-                <a:solidFill>
-                  <a:schemeClr val="tx1"/>
-                </a:solidFill>
-                <a:latin typeface="+mn-lt"/>
-                <a:ea typeface="+mn-ea"/>
-                <a:cs typeface="+mn-cs"/>
-              </a:defRPr>
-            </a:lvl7pPr>
-            <a:lvl8pPr marL="3200400" indent="0" algn="ctr" defTabSz="914400" rtl="0" eaLnBrk="1" latinLnBrk="0" hangingPunct="1">
-              <a:lnSpc>
-                <a:spcPct val="90000"/>
-              </a:lnSpc>
-              <a:spcBef>
-                <a:spcPts val="500"/>
-              </a:spcBef>
-              <a:buFont typeface="Arial" panose="020B0604020202020204" pitchFamily="34" charset="0"/>
-              <a:buNone/>
-              <a:defRPr sz="1600" kern="1200">
-                <a:solidFill>
-                  <a:schemeClr val="tx1"/>
-                </a:solidFill>
-                <a:latin typeface="+mn-lt"/>
-                <a:ea typeface="+mn-ea"/>
-                <a:cs typeface="+mn-cs"/>
-              </a:defRPr>
-            </a:lvl8pPr>
-            <a:lvl9pPr marL="3657600" indent="0" algn="ctr" defTabSz="914400" rtl="0" eaLnBrk="1" latinLnBrk="0" hangingPunct="1">
-              <a:lnSpc>
-                <a:spcPct val="90000"/>
-              </a:lnSpc>
-              <a:spcBef>
-                <a:spcPts val="500"/>
-              </a:spcBef>
-              <a:buFont typeface="Arial" panose="020B0604020202020204" pitchFamily="34" charset="0"/>
-              <a:buNone/>
-              <a:defRPr sz="1600" kern="1200">
-                <a:solidFill>
-                  <a:schemeClr val="tx1"/>
-                </a:solidFill>
-                <a:latin typeface="+mn-lt"/>
-                <a:ea typeface="+mn-ea"/>
-                <a:cs typeface="+mn-cs"/>
-              </a:defRPr>
-            </a:lvl9pPr>
-          </a:lstStyle>
-          <a:p>
-            <a:pPr algn="r"/>
-            <a:r>
-              <a:rPr lang="lt-LT" dirty="0" smtClean="0"/>
-              <a:t>Praktiką atliko: Jurgis Kargaudas</a:t>
-            </a:r>
-          </a:p>
-          <a:p>
-            <a:pPr algn="r"/>
-            <a:r>
-              <a:rPr lang="lt-LT" dirty="0" smtClean="0"/>
-              <a:t>Vadovas universitete: lekt. Aurimas Šimkus</a:t>
-            </a:r>
-          </a:p>
-          <a:p>
-            <a:pPr algn="r"/>
-            <a:r>
-              <a:rPr lang="lt-LT" dirty="0" smtClean="0"/>
-              <a:t>Vadovė įmonėje: Eglė Tamašauskienė</a:t>
-            </a:r>
-          </a:p>
-        </p:txBody>
-      </p:sp>
+        </p:grpSpPr>
+        <p:sp>
+          <p:nvSpPr>
+            <p:cNvPr id="4" name="Subtitle 2"/>
+            <p:cNvSpPr txBox="1">
+              <a:spLocks/>
+            </p:cNvSpPr>
+            <p:nvPr/>
+          </p:nvSpPr>
+          <p:spPr>
+            <a:xfrm>
+              <a:off x="6785811" y="5349875"/>
+              <a:ext cx="1879218" cy="1257755"/>
+            </a:xfrm>
+            <a:prstGeom prst="rect">
+              <a:avLst/>
+            </a:prstGeom>
+          </p:spPr>
+          <p:txBody>
+            <a:bodyPr vert="horz" lIns="91440" tIns="45720" rIns="91440" bIns="45720" rtlCol="0">
+              <a:normAutofit/>
+            </a:bodyPr>
+            <a:lstStyle>
+              <a:lvl1pPr marL="0" indent="0" algn="ctr" defTabSz="914400" rtl="0" eaLnBrk="1" latinLnBrk="0" hangingPunct="1">
+                <a:lnSpc>
+                  <a:spcPct val="90000"/>
+                </a:lnSpc>
+                <a:spcBef>
+                  <a:spcPts val="1000"/>
+                </a:spcBef>
+                <a:buFont typeface="Arial" panose="020B0604020202020204" pitchFamily="34" charset="0"/>
+                <a:buNone/>
+                <a:defRPr sz="2400" kern="1200">
+                  <a:solidFill>
+                    <a:schemeClr val="tx1"/>
+                  </a:solidFill>
+                  <a:latin typeface="+mn-lt"/>
+                  <a:ea typeface="+mn-ea"/>
+                  <a:cs typeface="+mn-cs"/>
+                </a:defRPr>
+              </a:lvl1pPr>
+              <a:lvl2pPr marL="457200" indent="0" algn="ctr" defTabSz="914400" rtl="0" eaLnBrk="1" latinLnBrk="0" hangingPunct="1">
+                <a:lnSpc>
+                  <a:spcPct val="90000"/>
+                </a:lnSpc>
+                <a:spcBef>
+                  <a:spcPts val="500"/>
+                </a:spcBef>
+                <a:buFont typeface="Arial" panose="020B0604020202020204" pitchFamily="34" charset="0"/>
+                <a:buNone/>
+                <a:defRPr sz="2000" kern="1200">
+                  <a:solidFill>
+                    <a:schemeClr val="tx1"/>
+                  </a:solidFill>
+                  <a:latin typeface="+mn-lt"/>
+                  <a:ea typeface="+mn-ea"/>
+                  <a:cs typeface="+mn-cs"/>
+                </a:defRPr>
+              </a:lvl2pPr>
+              <a:lvl3pPr marL="914400" indent="0" algn="ctr" defTabSz="914400" rtl="0" eaLnBrk="1" latinLnBrk="0" hangingPunct="1">
+                <a:lnSpc>
+                  <a:spcPct val="90000"/>
+                </a:lnSpc>
+                <a:spcBef>
+                  <a:spcPts val="500"/>
+                </a:spcBef>
+                <a:buFont typeface="Arial" panose="020B0604020202020204" pitchFamily="34" charset="0"/>
+                <a:buNone/>
+                <a:defRPr sz="1800" kern="1200">
+                  <a:solidFill>
+                    <a:schemeClr val="tx1"/>
+                  </a:solidFill>
+                  <a:latin typeface="+mn-lt"/>
+                  <a:ea typeface="+mn-ea"/>
+                  <a:cs typeface="+mn-cs"/>
+                </a:defRPr>
+              </a:lvl3pPr>
+              <a:lvl4pPr marL="1371600" indent="0" algn="ctr" defTabSz="914400" rtl="0" eaLnBrk="1" latinLnBrk="0" hangingPunct="1">
+                <a:lnSpc>
+                  <a:spcPct val="90000"/>
+                </a:lnSpc>
+                <a:spcBef>
+                  <a:spcPts val="500"/>
+                </a:spcBef>
+                <a:buFont typeface="Arial" panose="020B0604020202020204" pitchFamily="34" charset="0"/>
+                <a:buNone/>
+                <a:defRPr sz="1600" kern="1200">
+                  <a:solidFill>
+                    <a:schemeClr val="tx1"/>
+                  </a:solidFill>
+                  <a:latin typeface="+mn-lt"/>
+                  <a:ea typeface="+mn-ea"/>
+                  <a:cs typeface="+mn-cs"/>
+                </a:defRPr>
+              </a:lvl4pPr>
+              <a:lvl5pPr marL="1828800" indent="0" algn="ctr" defTabSz="914400" rtl="0" eaLnBrk="1" latinLnBrk="0" hangingPunct="1">
+                <a:lnSpc>
+                  <a:spcPct val="90000"/>
+                </a:lnSpc>
+                <a:spcBef>
+                  <a:spcPts val="500"/>
+                </a:spcBef>
+                <a:buFont typeface="Arial" panose="020B0604020202020204" pitchFamily="34" charset="0"/>
+                <a:buNone/>
+                <a:defRPr sz="1600" kern="1200">
+                  <a:solidFill>
+                    <a:schemeClr val="tx1"/>
+                  </a:solidFill>
+                  <a:latin typeface="+mn-lt"/>
+                  <a:ea typeface="+mn-ea"/>
+                  <a:cs typeface="+mn-cs"/>
+                </a:defRPr>
+              </a:lvl5pPr>
+              <a:lvl6pPr marL="2286000" indent="0" algn="ctr" defTabSz="914400" rtl="0" eaLnBrk="1" latinLnBrk="0" hangingPunct="1">
+                <a:lnSpc>
+                  <a:spcPct val="90000"/>
+                </a:lnSpc>
+                <a:spcBef>
+                  <a:spcPts val="500"/>
+                </a:spcBef>
+                <a:buFont typeface="Arial" panose="020B0604020202020204" pitchFamily="34" charset="0"/>
+                <a:buNone/>
+                <a:defRPr sz="1600" kern="1200">
+                  <a:solidFill>
+                    <a:schemeClr val="tx1"/>
+                  </a:solidFill>
+                  <a:latin typeface="+mn-lt"/>
+                  <a:ea typeface="+mn-ea"/>
+                  <a:cs typeface="+mn-cs"/>
+                </a:defRPr>
+              </a:lvl6pPr>
+              <a:lvl7pPr marL="2743200" indent="0" algn="ctr" defTabSz="914400" rtl="0" eaLnBrk="1" latinLnBrk="0" hangingPunct="1">
+                <a:lnSpc>
+                  <a:spcPct val="90000"/>
+                </a:lnSpc>
+                <a:spcBef>
+                  <a:spcPts val="500"/>
+                </a:spcBef>
+                <a:buFont typeface="Arial" panose="020B0604020202020204" pitchFamily="34" charset="0"/>
+                <a:buNone/>
+                <a:defRPr sz="1600" kern="1200">
+                  <a:solidFill>
+                    <a:schemeClr val="tx1"/>
+                  </a:solidFill>
+                  <a:latin typeface="+mn-lt"/>
+                  <a:ea typeface="+mn-ea"/>
+                  <a:cs typeface="+mn-cs"/>
+                </a:defRPr>
+              </a:lvl7pPr>
+              <a:lvl8pPr marL="3200400" indent="0" algn="ctr" defTabSz="914400" rtl="0" eaLnBrk="1" latinLnBrk="0" hangingPunct="1">
+                <a:lnSpc>
+                  <a:spcPct val="90000"/>
+                </a:lnSpc>
+                <a:spcBef>
+                  <a:spcPts val="500"/>
+                </a:spcBef>
+                <a:buFont typeface="Arial" panose="020B0604020202020204" pitchFamily="34" charset="0"/>
+                <a:buNone/>
+                <a:defRPr sz="1600" kern="1200">
+                  <a:solidFill>
+                    <a:schemeClr val="tx1"/>
+                  </a:solidFill>
+                  <a:latin typeface="+mn-lt"/>
+                  <a:ea typeface="+mn-ea"/>
+                  <a:cs typeface="+mn-cs"/>
+                </a:defRPr>
+              </a:lvl8pPr>
+              <a:lvl9pPr marL="3657600" indent="0" algn="ctr" defTabSz="914400" rtl="0" eaLnBrk="1" latinLnBrk="0" hangingPunct="1">
+                <a:lnSpc>
+                  <a:spcPct val="90000"/>
+                </a:lnSpc>
+                <a:spcBef>
+                  <a:spcPts val="500"/>
+                </a:spcBef>
+                <a:buFont typeface="Arial" panose="020B0604020202020204" pitchFamily="34" charset="0"/>
+                <a:buNone/>
+                <a:defRPr sz="1600" kern="1200">
+                  <a:solidFill>
+                    <a:schemeClr val="tx1"/>
+                  </a:solidFill>
+                  <a:latin typeface="+mn-lt"/>
+                  <a:ea typeface="+mn-ea"/>
+                  <a:cs typeface="+mn-cs"/>
+                </a:defRPr>
+              </a:lvl9pPr>
+            </a:lstStyle>
+            <a:p>
+              <a:pPr algn="l"/>
+              <a:r>
+                <a:rPr lang="lt-LT" sz="2000" dirty="0" smtClean="0"/>
+                <a:t>Atliko: </a:t>
+              </a:r>
+            </a:p>
+            <a:p>
+              <a:pPr algn="l"/>
+              <a:r>
+                <a:rPr lang="lt-LT" sz="2000" dirty="0" smtClean="0"/>
+                <a:t>Vadovas: </a:t>
+              </a:r>
+            </a:p>
+            <a:p>
+              <a:pPr algn="l"/>
+              <a:r>
+                <a:rPr lang="lt-LT" sz="2000" dirty="0" smtClean="0"/>
+                <a:t>Recenzentas</a:t>
+              </a:r>
+              <a:r>
+                <a:rPr lang="lt-LT" sz="2000" dirty="0" smtClean="0"/>
+                <a:t>:</a:t>
+              </a:r>
+              <a:endParaRPr lang="lt-LT" sz="2000" dirty="0" smtClean="0"/>
+            </a:p>
+          </p:txBody>
+        </p:sp>
+        <p:sp>
+          <p:nvSpPr>
+            <p:cNvPr id="5" name="Subtitle 2"/>
+            <p:cNvSpPr txBox="1">
+              <a:spLocks/>
+            </p:cNvSpPr>
+            <p:nvPr/>
+          </p:nvSpPr>
+          <p:spPr>
+            <a:xfrm>
+              <a:off x="8665029" y="5349876"/>
+              <a:ext cx="3331028" cy="1257754"/>
+            </a:xfrm>
+            <a:prstGeom prst="rect">
+              <a:avLst/>
+            </a:prstGeom>
+          </p:spPr>
+          <p:txBody>
+            <a:bodyPr vert="horz" lIns="91440" tIns="45720" rIns="91440" bIns="45720" rtlCol="0">
+              <a:normAutofit/>
+            </a:bodyPr>
+            <a:lstStyle>
+              <a:lvl1pPr marL="0" indent="0" algn="ctr" defTabSz="914400" rtl="0" eaLnBrk="1" latinLnBrk="0" hangingPunct="1">
+                <a:lnSpc>
+                  <a:spcPct val="90000"/>
+                </a:lnSpc>
+                <a:spcBef>
+                  <a:spcPts val="1000"/>
+                </a:spcBef>
+                <a:buFont typeface="Arial" panose="020B0604020202020204" pitchFamily="34" charset="0"/>
+                <a:buNone/>
+                <a:defRPr sz="2400" kern="1200">
+                  <a:solidFill>
+                    <a:schemeClr val="tx1"/>
+                  </a:solidFill>
+                  <a:latin typeface="+mn-lt"/>
+                  <a:ea typeface="+mn-ea"/>
+                  <a:cs typeface="+mn-cs"/>
+                </a:defRPr>
+              </a:lvl1pPr>
+              <a:lvl2pPr marL="457200" indent="0" algn="ctr" defTabSz="914400" rtl="0" eaLnBrk="1" latinLnBrk="0" hangingPunct="1">
+                <a:lnSpc>
+                  <a:spcPct val="90000"/>
+                </a:lnSpc>
+                <a:spcBef>
+                  <a:spcPts val="500"/>
+                </a:spcBef>
+                <a:buFont typeface="Arial" panose="020B0604020202020204" pitchFamily="34" charset="0"/>
+                <a:buNone/>
+                <a:defRPr sz="2000" kern="1200">
+                  <a:solidFill>
+                    <a:schemeClr val="tx1"/>
+                  </a:solidFill>
+                  <a:latin typeface="+mn-lt"/>
+                  <a:ea typeface="+mn-ea"/>
+                  <a:cs typeface="+mn-cs"/>
+                </a:defRPr>
+              </a:lvl2pPr>
+              <a:lvl3pPr marL="914400" indent="0" algn="ctr" defTabSz="914400" rtl="0" eaLnBrk="1" latinLnBrk="0" hangingPunct="1">
+                <a:lnSpc>
+                  <a:spcPct val="90000"/>
+                </a:lnSpc>
+                <a:spcBef>
+                  <a:spcPts val="500"/>
+                </a:spcBef>
+                <a:buFont typeface="Arial" panose="020B0604020202020204" pitchFamily="34" charset="0"/>
+                <a:buNone/>
+                <a:defRPr sz="1800" kern="1200">
+                  <a:solidFill>
+                    <a:schemeClr val="tx1"/>
+                  </a:solidFill>
+                  <a:latin typeface="+mn-lt"/>
+                  <a:ea typeface="+mn-ea"/>
+                  <a:cs typeface="+mn-cs"/>
+                </a:defRPr>
+              </a:lvl3pPr>
+              <a:lvl4pPr marL="1371600" indent="0" algn="ctr" defTabSz="914400" rtl="0" eaLnBrk="1" latinLnBrk="0" hangingPunct="1">
+                <a:lnSpc>
+                  <a:spcPct val="90000"/>
+                </a:lnSpc>
+                <a:spcBef>
+                  <a:spcPts val="500"/>
+                </a:spcBef>
+                <a:buFont typeface="Arial" panose="020B0604020202020204" pitchFamily="34" charset="0"/>
+                <a:buNone/>
+                <a:defRPr sz="1600" kern="1200">
+                  <a:solidFill>
+                    <a:schemeClr val="tx1"/>
+                  </a:solidFill>
+                  <a:latin typeface="+mn-lt"/>
+                  <a:ea typeface="+mn-ea"/>
+                  <a:cs typeface="+mn-cs"/>
+                </a:defRPr>
+              </a:lvl4pPr>
+              <a:lvl5pPr marL="1828800" indent="0" algn="ctr" defTabSz="914400" rtl="0" eaLnBrk="1" latinLnBrk="0" hangingPunct="1">
+                <a:lnSpc>
+                  <a:spcPct val="90000"/>
+                </a:lnSpc>
+                <a:spcBef>
+                  <a:spcPts val="500"/>
+                </a:spcBef>
+                <a:buFont typeface="Arial" panose="020B0604020202020204" pitchFamily="34" charset="0"/>
+                <a:buNone/>
+                <a:defRPr sz="1600" kern="1200">
+                  <a:solidFill>
+                    <a:schemeClr val="tx1"/>
+                  </a:solidFill>
+                  <a:latin typeface="+mn-lt"/>
+                  <a:ea typeface="+mn-ea"/>
+                  <a:cs typeface="+mn-cs"/>
+                </a:defRPr>
+              </a:lvl5pPr>
+              <a:lvl6pPr marL="2286000" indent="0" algn="ctr" defTabSz="914400" rtl="0" eaLnBrk="1" latinLnBrk="0" hangingPunct="1">
+                <a:lnSpc>
+                  <a:spcPct val="90000"/>
+                </a:lnSpc>
+                <a:spcBef>
+                  <a:spcPts val="500"/>
+                </a:spcBef>
+                <a:buFont typeface="Arial" panose="020B0604020202020204" pitchFamily="34" charset="0"/>
+                <a:buNone/>
+                <a:defRPr sz="1600" kern="1200">
+                  <a:solidFill>
+                    <a:schemeClr val="tx1"/>
+                  </a:solidFill>
+                  <a:latin typeface="+mn-lt"/>
+                  <a:ea typeface="+mn-ea"/>
+                  <a:cs typeface="+mn-cs"/>
+                </a:defRPr>
+              </a:lvl6pPr>
+              <a:lvl7pPr marL="2743200" indent="0" algn="ctr" defTabSz="914400" rtl="0" eaLnBrk="1" latinLnBrk="0" hangingPunct="1">
+                <a:lnSpc>
+                  <a:spcPct val="90000"/>
+                </a:lnSpc>
+                <a:spcBef>
+                  <a:spcPts val="500"/>
+                </a:spcBef>
+                <a:buFont typeface="Arial" panose="020B0604020202020204" pitchFamily="34" charset="0"/>
+                <a:buNone/>
+                <a:defRPr sz="1600" kern="1200">
+                  <a:solidFill>
+                    <a:schemeClr val="tx1"/>
+                  </a:solidFill>
+                  <a:latin typeface="+mn-lt"/>
+                  <a:ea typeface="+mn-ea"/>
+                  <a:cs typeface="+mn-cs"/>
+                </a:defRPr>
+              </a:lvl7pPr>
+              <a:lvl8pPr marL="3200400" indent="0" algn="ctr" defTabSz="914400" rtl="0" eaLnBrk="1" latinLnBrk="0" hangingPunct="1">
+                <a:lnSpc>
+                  <a:spcPct val="90000"/>
+                </a:lnSpc>
+                <a:spcBef>
+                  <a:spcPts val="500"/>
+                </a:spcBef>
+                <a:buFont typeface="Arial" panose="020B0604020202020204" pitchFamily="34" charset="0"/>
+                <a:buNone/>
+                <a:defRPr sz="1600" kern="1200">
+                  <a:solidFill>
+                    <a:schemeClr val="tx1"/>
+                  </a:solidFill>
+                  <a:latin typeface="+mn-lt"/>
+                  <a:ea typeface="+mn-ea"/>
+                  <a:cs typeface="+mn-cs"/>
+                </a:defRPr>
+              </a:lvl8pPr>
+              <a:lvl9pPr marL="3657600" indent="0" algn="ctr" defTabSz="914400" rtl="0" eaLnBrk="1" latinLnBrk="0" hangingPunct="1">
+                <a:lnSpc>
+                  <a:spcPct val="90000"/>
+                </a:lnSpc>
+                <a:spcBef>
+                  <a:spcPts val="500"/>
+                </a:spcBef>
+                <a:buFont typeface="Arial" panose="020B0604020202020204" pitchFamily="34" charset="0"/>
+                <a:buNone/>
+                <a:defRPr sz="1600" kern="1200">
+                  <a:solidFill>
+                    <a:schemeClr val="tx1"/>
+                  </a:solidFill>
+                  <a:latin typeface="+mn-lt"/>
+                  <a:ea typeface="+mn-ea"/>
+                  <a:cs typeface="+mn-cs"/>
+                </a:defRPr>
+              </a:lvl9pPr>
+            </a:lstStyle>
+            <a:p>
+              <a:pPr algn="l"/>
+              <a:r>
+                <a:rPr lang="lt-LT" sz="2000" dirty="0" smtClean="0"/>
+                <a:t>Jurgis </a:t>
+              </a:r>
+              <a:r>
+                <a:rPr lang="lt-LT" sz="2000" dirty="0" smtClean="0"/>
+                <a:t>Kargaudas</a:t>
+              </a:r>
+            </a:p>
+            <a:p>
+              <a:pPr algn="l"/>
+              <a:r>
+                <a:rPr lang="lt-LT" sz="2000" dirty="0" smtClean="0"/>
+                <a:t>lekt. </a:t>
+              </a:r>
+              <a:r>
+                <a:rPr lang="lt-LT" sz="2000" dirty="0" smtClean="0"/>
+                <a:t>Aurimas Šimkus</a:t>
+              </a:r>
+            </a:p>
+            <a:p>
+              <a:pPr algn="l"/>
+              <a:r>
+                <a:rPr lang="lt-LT" sz="2000" dirty="0" smtClean="0"/>
+                <a:t>partn. </a:t>
+              </a:r>
+              <a:r>
+                <a:rPr lang="lt-LT" sz="2000" dirty="0" smtClean="0"/>
+                <a:t>doc. Andrius Adamonis</a:t>
+              </a:r>
+              <a:endParaRPr lang="lt-LT" sz="2000" dirty="0" smtClean="0"/>
+            </a:p>
+          </p:txBody>
+        </p:sp>
+      </p:grpSp>
     </p:spTree>
     <p:extLst>
       <p:ext uri="{BB962C8B-B14F-4D97-AF65-F5344CB8AC3E}">
         <p14:creationId xmlns:p14="http://schemas.microsoft.com/office/powerpoint/2010/main" val="4282361530"/>
-      </p:ext>
-    </p:extLst>
-  </p:cSld>
-  <p:clrMapOvr>
-    <a:masterClrMapping/>
-  </p:clrMapOvr>
-  <p:timing>
-    <p:tnLst>
-      <p:par>
-        <p:cTn id="1" dur="indefinite" restart="never" nodeType="tmRoot"/>
-      </p:par>
-    </p:tnLst>
-  </p:timing>
-</p:sld>
-</file>
-
-<file path=ppt/slides/slide10.xml><?xml version="1.0" encoding="utf-8"?>
-<p:sld xmlns:a="http://schemas.openxmlformats.org/drawingml/2006/main" xmlns:r="http://schemas.openxmlformats.org/officeDocument/2006/relationships" xmlns:p="http://schemas.openxmlformats.org/presentationml/2006/main">
-  <p:cSld>
-    <p:spTree>
-      <p:nvGrpSpPr>
-        <p:cNvPr id="1" name=""/>
-        <p:cNvGrpSpPr/>
-        <p:nvPr/>
-      </p:nvGrpSpPr>
-      <p:grpSpPr>
-        <a:xfrm>
-          <a:off x="0" y="0"/>
-          <a:ext cx="0" cy="0"/>
-          <a:chOff x="0" y="0"/>
-          <a:chExt cx="0" cy="0"/>
-        </a:xfrm>
-      </p:grpSpPr>
-      <p:sp>
-        <p:nvSpPr>
-          <p:cNvPr id="2" name="Title 1"/>
-          <p:cNvSpPr>
-            <a:spLocks noGrp="1"/>
-          </p:cNvSpPr>
-          <p:nvPr>
-            <p:ph type="title"/>
-          </p:nvPr>
-        </p:nvSpPr>
-        <p:spPr/>
-        <p:txBody>
-          <a:bodyPr/>
-          <a:lstStyle/>
-          <a:p>
-            <a:pPr algn="ctr"/>
-            <a:r>
-              <a:rPr lang="lt-LT" smtClean="0"/>
-              <a:t>Išvados</a:t>
-            </a:r>
-            <a:endParaRPr lang="lt-LT"/>
-          </a:p>
-        </p:txBody>
-      </p:sp>
-      <p:sp>
-        <p:nvSpPr>
-          <p:cNvPr id="3" name="Content Placeholder 2"/>
-          <p:cNvSpPr>
-            <a:spLocks noGrp="1"/>
-          </p:cNvSpPr>
-          <p:nvPr>
-            <p:ph idx="1"/>
-          </p:nvPr>
-        </p:nvSpPr>
-        <p:spPr/>
-        <p:txBody>
-          <a:bodyPr/>
-          <a:lstStyle/>
-          <a:p>
-            <a:pPr marL="514350" indent="-514350">
-              <a:buFont typeface="+mj-lt"/>
-              <a:buAutoNum type="arabicPeriod"/>
-            </a:pPr>
-            <a:r>
-              <a:rPr lang="lt-LT" dirty="0" smtClean="0"/>
-              <a:t>Universiteto suteiktų teorinių žinių pakanka norint pradėti programuoti realiame projekte</a:t>
-            </a:r>
-          </a:p>
-          <a:p>
-            <a:pPr marL="514350" indent="-514350">
-              <a:buFont typeface="+mj-lt"/>
-              <a:buAutoNum type="arabicPeriod"/>
-            </a:pPr>
-            <a:r>
-              <a:rPr lang="lt-LT" dirty="0" smtClean="0"/>
-              <a:t>Praktikos užduotys leidžia tobulinti universitete įgytus programavimo įgūdžius</a:t>
-            </a:r>
-          </a:p>
-          <a:p>
-            <a:pPr marL="514350" indent="-514350">
-              <a:buFont typeface="+mj-lt"/>
-              <a:buAutoNum type="arabicPeriod"/>
-            </a:pPr>
-            <a:r>
-              <a:rPr lang="lt-LT" dirty="0" smtClean="0"/>
-              <a:t>Profesinė praktika sustiprina komunikavimo ir darbo komandoje įgūdžius</a:t>
-            </a:r>
-          </a:p>
-          <a:p>
-            <a:pPr marL="514350" indent="-514350">
-              <a:buFont typeface="+mj-lt"/>
-              <a:buAutoNum type="arabicPeriod"/>
-            </a:pPr>
-            <a:r>
-              <a:rPr lang="lt-LT" dirty="0" smtClean="0"/>
-              <a:t>Praktika „Cognizant“ įmonėje ir kompanijos darbuotojai užtikrina geras sąlygas studentams dirbti, padėti iškilus klausimams bei visapusiškai tobulėti dirbant prie realaus komandos projekto</a:t>
-            </a:r>
-            <a:endParaRPr lang="lt-LT" dirty="0"/>
-          </a:p>
-        </p:txBody>
-      </p:sp>
-    </p:spTree>
-    <p:extLst>
-      <p:ext uri="{BB962C8B-B14F-4D97-AF65-F5344CB8AC3E}">
-        <p14:creationId xmlns:p14="http://schemas.microsoft.com/office/powerpoint/2010/main" val="2710754389"/>
-      </p:ext>
-    </p:extLst>
-  </p:cSld>
-  <p:clrMapOvr>
-    <a:masterClrMapping/>
-  </p:clrMapOvr>
-  <p:timing>
-    <p:tnLst>
-      <p:par>
-        <p:cTn id="1" dur="indefinite" restart="never" nodeType="tmRoot"/>
-      </p:par>
-    </p:tnLst>
-  </p:timing>
-</p:sld>
-</file>
-
-<file path=ppt/slides/slide11.xml><?xml version="1.0" encoding="utf-8"?>
-<p:sld xmlns:a="http://schemas.openxmlformats.org/drawingml/2006/main" xmlns:r="http://schemas.openxmlformats.org/officeDocument/2006/relationships" xmlns:p="http://schemas.openxmlformats.org/presentationml/2006/main">
-  <p:cSld>
-    <p:spTree>
-      <p:nvGrpSpPr>
-        <p:cNvPr id="1" name=""/>
-        <p:cNvGrpSpPr/>
-        <p:nvPr/>
-      </p:nvGrpSpPr>
-      <p:grpSpPr>
-        <a:xfrm>
-          <a:off x="0" y="0"/>
-          <a:ext cx="0" cy="0"/>
-          <a:chOff x="0" y="0"/>
-          <a:chExt cx="0" cy="0"/>
-        </a:xfrm>
-      </p:grpSpPr>
-      <p:sp>
-        <p:nvSpPr>
-          <p:cNvPr id="2" name="Title 1"/>
-          <p:cNvSpPr>
-            <a:spLocks noGrp="1"/>
-          </p:cNvSpPr>
-          <p:nvPr>
-            <p:ph type="title"/>
-          </p:nvPr>
-        </p:nvSpPr>
-        <p:spPr/>
-        <p:txBody>
-          <a:bodyPr/>
-          <a:lstStyle/>
-          <a:p>
-            <a:pPr algn="ctr"/>
-            <a:r>
-              <a:rPr lang="lt-LT" smtClean="0"/>
-              <a:t>Pasiūlymai</a:t>
-            </a:r>
-            <a:endParaRPr lang="lt-LT"/>
-          </a:p>
-        </p:txBody>
-      </p:sp>
-      <p:sp>
-        <p:nvSpPr>
-          <p:cNvPr id="3" name="Content Placeholder 2"/>
-          <p:cNvSpPr>
-            <a:spLocks noGrp="1"/>
-          </p:cNvSpPr>
-          <p:nvPr>
-            <p:ph idx="1"/>
-          </p:nvPr>
-        </p:nvSpPr>
-        <p:spPr/>
-        <p:txBody>
-          <a:bodyPr/>
-          <a:lstStyle/>
-          <a:p>
-            <a:pPr marL="514350" indent="-514350">
-              <a:buFont typeface="+mj-lt"/>
-              <a:buAutoNum type="arabicPeriod"/>
-            </a:pPr>
-            <a:r>
-              <a:rPr lang="lt-LT" dirty="0" smtClean="0"/>
-              <a:t>Tarpkomandinės užduotys</a:t>
-            </a:r>
-          </a:p>
-          <a:p>
-            <a:pPr marL="514350" indent="-514350">
-              <a:buFont typeface="+mj-lt"/>
-              <a:buAutoNum type="arabicPeriod"/>
-            </a:pPr>
-            <a:r>
-              <a:rPr lang="lt-LT" dirty="0" smtClean="0"/>
-              <a:t>Programų sistemų architektūrų apžvalga</a:t>
-            </a:r>
-          </a:p>
-          <a:p>
-            <a:pPr marL="514350" indent="-514350">
-              <a:buFont typeface="+mj-lt"/>
-              <a:buAutoNum type="arabicPeriod"/>
-            </a:pPr>
-            <a:r>
-              <a:rPr lang="lt-LT" dirty="0" smtClean="0"/>
-              <a:t>Žinios apie nuolatinę integraciją</a:t>
-            </a:r>
-          </a:p>
-        </p:txBody>
-      </p:sp>
-    </p:spTree>
-    <p:extLst>
-      <p:ext uri="{BB962C8B-B14F-4D97-AF65-F5344CB8AC3E}">
-        <p14:creationId xmlns:p14="http://schemas.microsoft.com/office/powerpoint/2010/main" val="1127709529"/>
-      </p:ext>
-    </p:extLst>
-  </p:cSld>
-  <p:clrMapOvr>
-    <a:masterClrMapping/>
-  </p:clrMapOvr>
-  <p:timing>
-    <p:tnLst>
-      <p:par>
-        <p:cTn id="1" dur="indefinite" restart="never" nodeType="tmRoot"/>
-      </p:par>
-    </p:tnLst>
-  </p:timing>
-</p:sld>
-</file>
-
-<file path=ppt/slides/slide12.xml><?xml version="1.0" encoding="utf-8"?>
-<p:sld xmlns:a="http://schemas.openxmlformats.org/drawingml/2006/main" xmlns:r="http://schemas.openxmlformats.org/officeDocument/2006/relationships" xmlns:p="http://schemas.openxmlformats.org/presentationml/2006/main">
-  <p:cSld>
-    <p:spTree>
-      <p:nvGrpSpPr>
-        <p:cNvPr id="1" name=""/>
-        <p:cNvGrpSpPr/>
-        <p:nvPr/>
-      </p:nvGrpSpPr>
-      <p:grpSpPr>
-        <a:xfrm>
-          <a:off x="0" y="0"/>
-          <a:ext cx="0" cy="0"/>
-          <a:chOff x="0" y="0"/>
-          <a:chExt cx="0" cy="0"/>
-        </a:xfrm>
-      </p:grpSpPr>
-      <p:sp>
-        <p:nvSpPr>
-          <p:cNvPr id="2" name="Title 1"/>
-          <p:cNvSpPr>
-            <a:spLocks noGrp="1"/>
-          </p:cNvSpPr>
-          <p:nvPr>
-            <p:ph type="title"/>
-          </p:nvPr>
-        </p:nvSpPr>
-        <p:spPr/>
-        <p:txBody>
-          <a:bodyPr/>
-          <a:lstStyle/>
-          <a:p>
-            <a:pPr algn="ctr"/>
-            <a:r>
-              <a:rPr lang="lt-LT" dirty="0" smtClean="0"/>
-              <a:t>Klausimai</a:t>
-            </a:r>
-            <a:endParaRPr lang="lt-LT" dirty="0"/>
-          </a:p>
-        </p:txBody>
-      </p:sp>
-      <p:pic>
-        <p:nvPicPr>
-          <p:cNvPr id="4" name="Content Placeholder 3"/>
-          <p:cNvPicPr>
-            <a:picLocks noGrp="1" noChangeAspect="1"/>
-          </p:cNvPicPr>
-          <p:nvPr>
-            <p:ph idx="1"/>
-          </p:nvPr>
-        </p:nvPicPr>
-        <p:blipFill>
-          <a:blip r:embed="rId2" cstate="print">
-            <a:extLst>
-              <a:ext uri="{28A0092B-C50C-407E-A947-70E740481C1C}">
-                <a14:useLocalDpi xmlns:a14="http://schemas.microsoft.com/office/drawing/2010/main" val="0"/>
-              </a:ext>
-            </a:extLst>
-          </a:blip>
-          <a:stretch>
-            <a:fillRect/>
-          </a:stretch>
-        </p:blipFill>
-        <p:spPr>
-          <a:xfrm>
-            <a:off x="4261335" y="1690688"/>
-            <a:ext cx="3669329" cy="4891750"/>
-          </a:xfrm>
-        </p:spPr>
-      </p:pic>
-    </p:spTree>
-    <p:extLst>
-      <p:ext uri="{BB962C8B-B14F-4D97-AF65-F5344CB8AC3E}">
-        <p14:creationId xmlns:p14="http://schemas.microsoft.com/office/powerpoint/2010/main" val="1184546887"/>
       </p:ext>
     </p:extLst>
   </p:cSld>
@@ -4546,7 +4384,12 @@
             <p:ph type="title"/>
           </p:nvPr>
         </p:nvSpPr>
-        <p:spPr/>
+        <p:spPr>
+          <a:xfrm>
+            <a:off x="0" y="0"/>
+            <a:ext cx="12192000" cy="1325563"/>
+          </a:xfrm>
+        </p:spPr>
         <p:txBody>
           <a:bodyPr>
             <a:normAutofit/>
@@ -4556,92 +4399,116 @@
             <a:pPr algn="ctr"/>
             <a:r>
               <a:rPr lang="lt-LT" dirty="0" smtClean="0"/>
-              <a:t>Cognizant Technology Solutions Lithuania</a:t>
+              <a:t>Tematika</a:t>
             </a:r>
             <a:endParaRPr lang="lt-LT" sz="4800" dirty="0"/>
           </a:p>
         </p:txBody>
       </p:sp>
-      <p:sp>
-        <p:nvSpPr>
-          <p:cNvPr id="3" name="Content Placeholder 2"/>
-          <p:cNvSpPr>
-            <a:spLocks noGrp="1"/>
-          </p:cNvSpPr>
-          <p:nvPr>
-            <p:ph idx="1"/>
-          </p:nvPr>
-        </p:nvSpPr>
+      <p:cxnSp>
+        <p:nvCxnSpPr>
+          <p:cNvPr id="54" name="Straight Connector 53"/>
+          <p:cNvCxnSpPr/>
+          <p:nvPr/>
+        </p:nvCxnSpPr>
         <p:spPr>
           <a:xfrm>
-            <a:off x="481263" y="2167165"/>
-            <a:ext cx="11534273" cy="4351338"/>
+            <a:off x="6183085" y="1443528"/>
+            <a:ext cx="1" cy="4173501"/>
           </a:xfrm>
+          <a:prstGeom prst="line">
+            <a:avLst/>
+          </a:prstGeom>
+          <a:ln>
+            <a:solidFill>
+              <a:schemeClr val="tx1"/>
+            </a:solidFill>
+          </a:ln>
         </p:spPr>
-        <p:txBody>
-          <a:bodyPr/>
-          <a:lstStyle/>
-          <a:p>
-            <a:pPr marL="0" indent="0">
-              <a:buNone/>
-            </a:pPr>
+        <p:style>
+          <a:lnRef idx="1">
+            <a:schemeClr val="accent1"/>
+          </a:lnRef>
+          <a:fillRef idx="0">
+            <a:schemeClr val="accent1"/>
+          </a:fillRef>
+          <a:effectRef idx="0">
+            <a:schemeClr val="accent1"/>
+          </a:effectRef>
+          <a:fontRef idx="minor">
+            <a:schemeClr val="tx1"/>
+          </a:fontRef>
+        </p:style>
+      </p:cxnSp>
+      <p:sp>
+        <p:nvSpPr>
+          <p:cNvPr id="56" name="Rectangle 55"/>
+          <p:cNvSpPr/>
+          <p:nvPr/>
+        </p:nvSpPr>
+        <p:spPr>
+          <a:xfrm>
+            <a:off x="185056" y="1589740"/>
+            <a:ext cx="6096000" cy="923330"/>
+          </a:xfrm>
+          <a:prstGeom prst="rect">
+            <a:avLst/>
+          </a:prstGeom>
+        </p:spPr>
+        <p:txBody>
+          <a:bodyPr>
+            <a:spAutoFit/>
+          </a:bodyPr>
+          <a:lstStyle/>
+          <a:p>
+            <a:r>
+              <a:rPr lang="lt-LT" b="1" dirty="0" smtClean="0"/>
+              <a:t>Skaitmeninė </a:t>
+            </a:r>
+            <a:r>
+              <a:rPr lang="lt-LT" b="1" dirty="0"/>
+              <a:t>tapatybė </a:t>
+            </a:r>
             <a:r>
               <a:rPr lang="lt-LT" dirty="0"/>
-              <a:t> </a:t>
+              <a:t>- abstrakti fizinės esybės reprezentacija, sudaryta iš aibės esybės nuolatinių ar laikinų atributų, kurie susiejami su fizine esybe.</a:t>
+            </a:r>
+            <a:endParaRPr lang="lt-LT" dirty="0"/>
+          </a:p>
+        </p:txBody>
+      </p:sp>
+      <p:sp>
+        <p:nvSpPr>
+          <p:cNvPr id="57" name="Rectangle 56"/>
+          <p:cNvSpPr/>
+          <p:nvPr/>
+        </p:nvSpPr>
+        <p:spPr>
+          <a:xfrm>
+            <a:off x="6183086" y="1589740"/>
+            <a:ext cx="6008914" cy="646331"/>
+          </a:xfrm>
+          <a:prstGeom prst="rect">
+            <a:avLst/>
+          </a:prstGeom>
+        </p:spPr>
+        <p:txBody>
+          <a:bodyPr wrap="square">
+            <a:spAutoFit/>
+          </a:bodyPr>
+          <a:lstStyle/>
+          <a:p>
+            <a:r>
+              <a:rPr lang="lt-LT" b="1" dirty="0"/>
+              <a:t>Blokų grandinė </a:t>
+            </a:r>
+            <a:r>
+              <a:rPr lang="lt-LT" dirty="0"/>
+              <a:t>- tai vieno su kitu </a:t>
             </a:r>
             <a:r>
               <a:rPr lang="lt-LT" dirty="0" smtClean="0"/>
-              <a:t>                   - paslaugų įmonė, orientuota į verslo klientų procesų tobulinimą</a:t>
-            </a:r>
-          </a:p>
-          <a:p>
-            <a:pPr marL="0" indent="0">
-              <a:buNone/>
-            </a:pPr>
-            <a:endParaRPr lang="lt-LT" dirty="0" smtClean="0"/>
-          </a:p>
-          <a:p>
-            <a:pPr marL="0" indent="0">
-              <a:buNone/>
-            </a:pPr>
-            <a:endParaRPr lang="lt-LT" dirty="0" smtClean="0"/>
-          </a:p>
-          <a:p>
-            <a:r>
-              <a:rPr lang="lt-LT" dirty="0" smtClean="0"/>
-              <a:t>200 000+ darbuotojų ir keli šimtai padalinių</a:t>
-            </a:r>
-          </a:p>
-          <a:p>
-            <a:r>
-              <a:rPr lang="lt-LT" dirty="0" smtClean="0"/>
-              <a:t>Lietuvoje 600+ darbuotojų, iš jų 50+ IT skyriuje</a:t>
-            </a:r>
-          </a:p>
-          <a:p>
-            <a:r>
-              <a:rPr lang="lt-LT" dirty="0" smtClean="0"/>
-              <a:t>Lietuvos padalinio rinka – Skandinavijos finansų sektorius</a:t>
-            </a:r>
-          </a:p>
-          <a:p>
-            <a:endParaRPr lang="lt-LT" dirty="0" smtClean="0"/>
-          </a:p>
-          <a:p>
-            <a:pPr marL="0" indent="0">
-              <a:buNone/>
-            </a:pPr>
-            <a:r>
-              <a:rPr lang="lt-LT" dirty="0" smtClean="0"/>
-              <a:t>Praktika atlikta </a:t>
-            </a:r>
-            <a:r>
-              <a:rPr lang="lt-LT" b="1" dirty="0" smtClean="0"/>
-              <a:t>Local Systems Sweden (LSS) </a:t>
-            </a:r>
-            <a:r>
-              <a:rPr lang="lt-LT" dirty="0" smtClean="0"/>
-              <a:t>komandoje</a:t>
+              <a:t>kriptografiškai susijusių įrašų grandinė, kuriuose saugomi nekintami duomenys.</a:t>
             </a:r>
             <a:endParaRPr lang="lt-LT" dirty="0"/>
           </a:p>
@@ -4649,28 +4516,126 @@
       </p:sp>
       <p:pic>
         <p:nvPicPr>
-          <p:cNvPr id="4" name="Picture 3"/>
+          <p:cNvPr id="60" name="Picture 59"/>
           <p:cNvPicPr>
             <a:picLocks noChangeAspect="1"/>
           </p:cNvPicPr>
           <p:nvPr/>
         </p:nvPicPr>
         <p:blipFill>
-          <a:blip r:embed="rId3">
-            <a:extLst>
-              <a:ext uri="{28A0092B-C50C-407E-A947-70E740481C1C}">
-                <a14:useLocalDpi xmlns:a14="http://schemas.microsoft.com/office/drawing/2010/main" val="0"/>
-              </a:ext>
-            </a:extLst>
-          </a:blip>
+          <a:blip r:embed="rId3"/>
           <a:stretch>
             <a:fillRect/>
           </a:stretch>
         </p:blipFill>
         <p:spPr>
           <a:xfrm>
-            <a:off x="350345" y="1382486"/>
-            <a:ext cx="1664823" cy="1746318"/>
+            <a:off x="6281056" y="2174033"/>
+            <a:ext cx="5467350" cy="3267075"/>
+          </a:xfrm>
+          <a:prstGeom prst="rect">
+            <a:avLst/>
+          </a:prstGeom>
+        </p:spPr>
+      </p:pic>
+      <p:cxnSp>
+        <p:nvCxnSpPr>
+          <p:cNvPr id="62" name="Straight Connector 61"/>
+          <p:cNvCxnSpPr/>
+          <p:nvPr/>
+        </p:nvCxnSpPr>
+        <p:spPr>
+          <a:xfrm>
+            <a:off x="136071" y="5713279"/>
+            <a:ext cx="11947072" cy="18373"/>
+          </a:xfrm>
+          <a:prstGeom prst="line">
+            <a:avLst/>
+          </a:prstGeom>
+          <a:ln>
+            <a:solidFill>
+              <a:schemeClr val="tx1"/>
+            </a:solidFill>
+          </a:ln>
+        </p:spPr>
+        <p:style>
+          <a:lnRef idx="1">
+            <a:schemeClr val="accent1"/>
+          </a:lnRef>
+          <a:fillRef idx="0">
+            <a:schemeClr val="accent1"/>
+          </a:fillRef>
+          <a:effectRef idx="0">
+            <a:schemeClr val="accent1"/>
+          </a:effectRef>
+          <a:fontRef idx="minor">
+            <a:schemeClr val="tx1"/>
+          </a:fontRef>
+        </p:style>
+      </p:cxnSp>
+      <p:sp>
+        <p:nvSpPr>
+          <p:cNvPr id="66" name="TextBox 65"/>
+          <p:cNvSpPr txBox="1"/>
+          <p:nvPr/>
+        </p:nvSpPr>
+        <p:spPr>
+          <a:xfrm>
+            <a:off x="13607" y="5778825"/>
+            <a:ext cx="12191999" cy="923330"/>
+          </a:xfrm>
+          <a:prstGeom prst="rect">
+            <a:avLst/>
+          </a:prstGeom>
+          <a:noFill/>
+        </p:spPr>
+        <p:txBody>
+          <a:bodyPr wrap="square" rtlCol="0">
+            <a:spAutoFit/>
+          </a:bodyPr>
+          <a:lstStyle/>
+          <a:p>
+            <a:pPr algn="ctr"/>
+            <a:r>
+              <a:rPr lang="lt-LT" dirty="0" smtClean="0"/>
+              <a:t>Kaip blokų grandinę pritaikyti skaitmeninės tapatybės valdyme?</a:t>
+            </a:r>
+          </a:p>
+          <a:p>
+            <a:pPr algn="ctr"/>
+            <a:r>
+              <a:rPr lang="lt-LT" dirty="0" smtClean="0"/>
+              <a:t>Ką tai duoda naudotojams?</a:t>
+            </a:r>
+          </a:p>
+          <a:p>
+            <a:pPr algn="ctr"/>
+            <a:r>
+              <a:rPr lang="lt-LT" dirty="0" smtClean="0"/>
+              <a:t>Ar verta technologiją taikyti šioje srityje?</a:t>
+            </a:r>
+            <a:endParaRPr lang="lt-LT" dirty="0"/>
+          </a:p>
+        </p:txBody>
+      </p:sp>
+      <p:pic>
+        <p:nvPicPr>
+          <p:cNvPr id="67" name="Picture 66"/>
+          <p:cNvPicPr>
+            <a:picLocks noChangeAspect="1"/>
+          </p:cNvPicPr>
+          <p:nvPr/>
+        </p:nvPicPr>
+        <p:blipFill>
+          <a:blip r:embed="rId4"/>
+          <a:stretch>
+            <a:fillRect/>
+          </a:stretch>
+        </p:blipFill>
+        <p:spPr>
+          <a:xfrm>
+            <a:off x="136071" y="2513070"/>
+            <a:ext cx="5739491" cy="3180215"/>
           </a:xfrm>
           <a:prstGeom prst="rect">
             <a:avLst/>
@@ -4716,615 +4681,221 @@
       </p:grpSpPr>
       <p:sp>
         <p:nvSpPr>
-          <p:cNvPr id="2" name="Title 1"/>
-          <p:cNvSpPr>
-            <a:spLocks noGrp="1"/>
-          </p:cNvSpPr>
-          <p:nvPr>
-            <p:ph type="title"/>
-          </p:nvPr>
-        </p:nvSpPr>
-        <p:spPr/>
-        <p:txBody>
-          <a:bodyPr/>
-          <a:lstStyle/>
-          <a:p>
-            <a:pPr algn="ctr"/>
+          <p:cNvPr id="3" name="Content Placeholder 2"/>
+          <p:cNvSpPr>
+            <a:spLocks noGrp="1"/>
+          </p:cNvSpPr>
+          <p:nvPr>
+            <p:ph idx="1"/>
+          </p:nvPr>
+        </p:nvSpPr>
+        <p:spPr>
+          <a:xfrm>
+            <a:off x="478970" y="1752600"/>
+            <a:ext cx="11713029" cy="5105400"/>
+          </a:xfrm>
+        </p:spPr>
+        <p:txBody>
+          <a:bodyPr>
+            <a:normAutofit fontScale="92500" lnSpcReduction="20000"/>
+          </a:bodyPr>
+          <a:lstStyle/>
+          <a:p>
+            <a:pPr marL="0" indent="0">
+              <a:buNone/>
+            </a:pPr>
+            <a:r>
+              <a:rPr lang="lt-LT" b="1" dirty="0"/>
+              <a:t>Darbo tikslas </a:t>
+            </a:r>
+            <a:r>
+              <a:rPr lang="lt-LT" dirty="0"/>
+              <a:t>- įvertinti blokų grandinės tinkamumą skaitmeninės tapatybės </a:t>
+            </a:r>
             <a:r>
               <a:rPr lang="lt-LT" dirty="0" smtClean="0"/>
-              <a:t>Praktikos sąlygos LSS komandoje</a:t>
-            </a:r>
-            <a:endParaRPr lang="lt-LT" sz="3600" dirty="0"/>
-          </a:p>
-        </p:txBody>
-      </p:sp>
-      <p:sp>
-        <p:nvSpPr>
-          <p:cNvPr id="3" name="Content Placeholder 2"/>
-          <p:cNvSpPr>
-            <a:spLocks noGrp="1"/>
-          </p:cNvSpPr>
-          <p:nvPr>
-            <p:ph idx="1"/>
-          </p:nvPr>
-        </p:nvSpPr>
-        <p:spPr/>
-        <p:txBody>
-          <a:bodyPr>
-            <a:normAutofit lnSpcReduction="10000"/>
-          </a:bodyPr>
-          <a:lstStyle/>
-          <a:p>
-            <a:r>
-              <a:rPr lang="lt-LT" dirty="0" smtClean="0"/>
-              <a:t>Judrieji programų kūrimo procesai </a:t>
-            </a:r>
-            <a:r>
-              <a:rPr lang="lt-LT" i="1" dirty="0" smtClean="0"/>
-              <a:t>Scrum</a:t>
-            </a:r>
-            <a:r>
-              <a:rPr lang="lt-LT" dirty="0" smtClean="0"/>
-              <a:t> bei </a:t>
-            </a:r>
-            <a:r>
-              <a:rPr lang="lt-LT" i="1" dirty="0" smtClean="0"/>
-              <a:t>Kanban</a:t>
-            </a:r>
-            <a:r>
-              <a:rPr lang="lt-LT" i="1" baseline="30000" dirty="0" smtClean="0"/>
-              <a:t>1</a:t>
-            </a:r>
-            <a:endParaRPr lang="lt-LT" baseline="30000" dirty="0" smtClean="0"/>
-          </a:p>
-          <a:p>
-            <a:r>
-              <a:rPr lang="lt-LT" dirty="0" smtClean="0"/>
-              <a:t>Praktikos metu naudotos technologijos:</a:t>
-            </a:r>
-            <a:endParaRPr lang="en-US" dirty="0" smtClean="0"/>
-          </a:p>
-          <a:p>
-            <a:endParaRPr lang="en-US" dirty="0" smtClean="0"/>
-          </a:p>
-          <a:p>
-            <a:pPr lvl="1"/>
-            <a:endParaRPr lang="en-US" dirty="0" smtClean="0"/>
-          </a:p>
-          <a:p>
-            <a:pPr lvl="1"/>
-            <a:endParaRPr lang="en-US" dirty="0"/>
-          </a:p>
-          <a:p>
-            <a:pPr lvl="1"/>
-            <a:endParaRPr lang="en-US" dirty="0"/>
-          </a:p>
-          <a:p>
-            <a:pPr lvl="1"/>
-            <a:endParaRPr lang="en-US" dirty="0" smtClean="0"/>
-          </a:p>
-          <a:p>
-            <a:pPr marL="457200" lvl="1" indent="0">
+              <a:t>valdymui.</a:t>
+            </a:r>
+          </a:p>
+          <a:p>
+            <a:pPr marL="0" indent="0">
               <a:buNone/>
             </a:pPr>
             <a:endParaRPr lang="lt-LT" dirty="0" smtClean="0"/>
           </a:p>
           <a:p>
-            <a:endParaRPr lang="en-US" dirty="0" smtClean="0"/>
-          </a:p>
-          <a:p>
+            <a:pPr marL="0" indent="0">
+              <a:buNone/>
+            </a:pPr>
+            <a:r>
+              <a:rPr lang="lt-LT" b="1" dirty="0"/>
+              <a:t>Darbe keliami uždaviniai</a:t>
+            </a:r>
             <a:r>
               <a:rPr lang="lt-LT" dirty="0" smtClean="0"/>
-              <a:t>Nuolatinė integracija</a:t>
-            </a:r>
-            <a:r>
-              <a:rPr lang="lt-LT" baseline="30000" dirty="0" smtClean="0"/>
-              <a:t>2</a:t>
-            </a:r>
+              <a:t>:</a:t>
+            </a:r>
+          </a:p>
+          <a:p>
+            <a:pPr marL="514350" indent="-514350">
+              <a:buFont typeface="+mj-lt"/>
+              <a:buAutoNum type="arabicPeriod"/>
+            </a:pPr>
             <a:r>
               <a:rPr lang="lt-LT" dirty="0" smtClean="0"/>
-              <a:t> naudojant </a:t>
-            </a:r>
-            <a:r>
-              <a:rPr lang="lt-LT" i="1" dirty="0" smtClean="0"/>
-              <a:t>TFS</a:t>
+              <a:t>Apžvelgti </a:t>
+            </a:r>
+            <a:r>
+              <a:rPr lang="lt-LT" dirty="0"/>
+              <a:t>skaitmeninės tapatybės valdymo sprendimus, vertinant jų gebėjimą įgyvendinti naudotojų </a:t>
             </a:r>
             <a:r>
               <a:rPr lang="lt-LT" dirty="0" smtClean="0"/>
-              <a:t>, </a:t>
-            </a:r>
-            <a:r>
-              <a:rPr lang="lt-LT" i="1" dirty="0" smtClean="0"/>
-              <a:t>Octopus</a:t>
-            </a:r>
-          </a:p>
-        </p:txBody>
-      </p:sp>
-      <p:sp>
-        <p:nvSpPr>
-          <p:cNvPr id="5" name="Footer Placeholder 4"/>
-          <p:cNvSpPr>
-            <a:spLocks noGrp="1"/>
-          </p:cNvSpPr>
-          <p:nvPr>
-            <p:ph type="ftr" sz="quarter" idx="11"/>
-          </p:nvPr>
+              <a:t>poreikius.</a:t>
+            </a:r>
+          </a:p>
+          <a:p>
+            <a:pPr marL="514350" indent="-514350">
+              <a:buFont typeface="+mj-lt"/>
+              <a:buAutoNum type="arabicPeriod"/>
+            </a:pPr>
+            <a:r>
+              <a:rPr lang="lt-LT" dirty="0" smtClean="0"/>
+              <a:t>Įvardyti </a:t>
+            </a:r>
+            <a:r>
+              <a:rPr lang="lt-LT" dirty="0"/>
+              <a:t>naudotojams kylančias problemas skaitmeninės tapatybės </a:t>
+            </a:r>
+            <a:r>
+              <a:rPr lang="lt-LT" dirty="0" smtClean="0"/>
+              <a:t>valdyme.</a:t>
+            </a:r>
+          </a:p>
+          <a:p>
+            <a:pPr marL="514350" indent="-514350">
+              <a:buFont typeface="+mj-lt"/>
+              <a:buAutoNum type="arabicPeriod"/>
+            </a:pPr>
+            <a:r>
+              <a:rPr lang="lt-LT" dirty="0" smtClean="0"/>
+              <a:t>Apžvelgti </a:t>
+            </a:r>
+            <a:r>
+              <a:rPr lang="lt-LT" dirty="0"/>
+              <a:t>blokų grandinės technologiją ir jos </a:t>
+            </a:r>
+            <a:r>
+              <a:rPr lang="lt-LT" dirty="0" smtClean="0"/>
+              <a:t>savybes.</a:t>
+            </a:r>
+          </a:p>
+          <a:p>
+            <a:pPr marL="514350" indent="-514350">
+              <a:buFont typeface="+mj-lt"/>
+              <a:buAutoNum type="arabicPeriod"/>
+            </a:pPr>
+            <a:r>
+              <a:rPr lang="lt-LT" dirty="0" smtClean="0"/>
+              <a:t>Atsižvelgus </a:t>
+            </a:r>
+            <a:r>
+              <a:rPr lang="lt-LT" dirty="0"/>
+              <a:t>į blokų grandinės savybes ir esamą jos taikymą tapatybės srityje. įvertinti blokų grandinės gebėjimą spręsti įvardytas naudotojų problemas</a:t>
+            </a:r>
+            <a:r>
+              <a:rPr lang="lt-LT" dirty="0" smtClean="0"/>
+              <a:t>.</a:t>
+            </a:r>
+          </a:p>
+          <a:p>
+            <a:pPr marL="514350" indent="-514350">
+              <a:buFont typeface="+mj-lt"/>
+              <a:buAutoNum type="arabicPeriod"/>
+            </a:pPr>
+            <a:r>
+              <a:rPr lang="lt-LT" dirty="0" smtClean="0"/>
+              <a:t>Pateikti </a:t>
+            </a:r>
+            <a:r>
+              <a:rPr lang="lt-LT" dirty="0"/>
+              <a:t>blokų grandinės panaudojimo atvejį skaitmeninės tapatybės valdymui ir sukurti jo veikimą demonstruojantį prototipą</a:t>
+            </a:r>
+            <a:r>
+              <a:rPr lang="lt-LT" dirty="0" smtClean="0"/>
+              <a:t>.</a:t>
+            </a:r>
+          </a:p>
+          <a:p>
+            <a:pPr marL="514350" indent="-514350">
+              <a:buFont typeface="+mj-lt"/>
+              <a:buAutoNum type="arabicPeriod"/>
+            </a:pPr>
+            <a:r>
+              <a:rPr lang="lt-LT" dirty="0" smtClean="0"/>
+              <a:t>Įvertinti </a:t>
+            </a:r>
+            <a:r>
+              <a:rPr lang="lt-LT" dirty="0"/>
+              <a:t>pateiktą sprendimą apibūdinant jo privalumus, trūkumus ir galimus pritaikymo barjerus.</a:t>
+            </a:r>
+          </a:p>
+        </p:txBody>
+      </p:sp>
+      <p:sp>
+        <p:nvSpPr>
+          <p:cNvPr id="5" name="Title 1"/>
+          <p:cNvSpPr txBox="1">
+            <a:spLocks/>
+          </p:cNvSpPr>
+          <p:nvPr/>
         </p:nvSpPr>
         <p:spPr>
           <a:xfrm>
-            <a:off x="838200" y="6311900"/>
-            <a:ext cx="5471160" cy="365125"/>
-          </a:xfrm>
-        </p:spPr>
-        <p:txBody>
-          <a:bodyPr/>
-          <a:lstStyle/>
-          <a:p>
-            <a:pPr algn="l"/>
-            <a:r>
-              <a:rPr lang="pt-BR" sz="1600" baseline="30000" dirty="0" smtClean="0"/>
-              <a:t>1</a:t>
-            </a:r>
-            <a:r>
-              <a:rPr lang="pt-BR" sz="1600" dirty="0" smtClean="0"/>
-              <a:t> </a:t>
-            </a:r>
-            <a:r>
-              <a:rPr lang="lt-LT" sz="1600" dirty="0" smtClean="0"/>
-              <a:t>taikytas procesas </a:t>
-            </a:r>
-            <a:r>
-              <a:rPr lang="pt-BR" sz="1600" dirty="0" smtClean="0"/>
-              <a:t>pavaizduotas 2-ame paveiksle</a:t>
-            </a:r>
-            <a:endParaRPr lang="lt-LT" sz="1600" dirty="0" smtClean="0"/>
-          </a:p>
-          <a:p>
-            <a:pPr algn="l"/>
-            <a:r>
-              <a:rPr lang="pt-BR" sz="1600" baseline="30000" dirty="0" smtClean="0"/>
-              <a:t>2</a:t>
-            </a:r>
-            <a:r>
-              <a:rPr lang="pt-BR" sz="1600" dirty="0" smtClean="0"/>
-              <a:t> </a:t>
-            </a:r>
-            <a:r>
-              <a:rPr lang="lt-LT" sz="1600" dirty="0" smtClean="0"/>
-              <a:t>nuolatinės integracijos </a:t>
-            </a:r>
-            <a:r>
-              <a:rPr lang="pt-BR" sz="1600" dirty="0" smtClean="0"/>
-              <a:t>diagrama pateikiama 1-ame paveiksle</a:t>
-            </a:r>
-            <a:endParaRPr lang="lt-LT" sz="1600" dirty="0"/>
-          </a:p>
-        </p:txBody>
-      </p:sp>
-      <p:pic>
-        <p:nvPicPr>
-          <p:cNvPr id="4" name="Picture 3"/>
-          <p:cNvPicPr>
-            <a:picLocks noChangeAspect="1"/>
-          </p:cNvPicPr>
-          <p:nvPr/>
-        </p:nvPicPr>
-        <p:blipFill>
-          <a:blip r:embed="rId3">
-            <a:extLst>
-              <a:ext uri="{28A0092B-C50C-407E-A947-70E740481C1C}">
-                <a14:useLocalDpi xmlns:a14="http://schemas.microsoft.com/office/drawing/2010/main" val="0"/>
-              </a:ext>
-            </a:extLst>
-          </a:blip>
-          <a:stretch>
-            <a:fillRect/>
-          </a:stretch>
-        </p:blipFill>
-        <p:spPr>
-          <a:xfrm>
-            <a:off x="1111155" y="2849533"/>
-            <a:ext cx="861289" cy="861289"/>
+            <a:off x="0" y="0"/>
+            <a:ext cx="12192000" cy="1325563"/>
           </a:xfrm>
           <a:prstGeom prst="rect">
             <a:avLst/>
           </a:prstGeom>
         </p:spPr>
-      </p:pic>
-      <p:pic>
-        <p:nvPicPr>
-          <p:cNvPr id="6" name="Picture 5"/>
-          <p:cNvPicPr>
-            <a:picLocks noChangeAspect="1"/>
-          </p:cNvPicPr>
-          <p:nvPr/>
-        </p:nvPicPr>
-        <p:blipFill>
-          <a:blip r:embed="rId4">
-            <a:extLst>
-              <a:ext uri="{28A0092B-C50C-407E-A947-70E740481C1C}">
-                <a14:useLocalDpi xmlns:a14="http://schemas.microsoft.com/office/drawing/2010/main" val="0"/>
-              </a:ext>
-            </a:extLst>
-          </a:blip>
-          <a:stretch>
-            <a:fillRect/>
-          </a:stretch>
-        </p:blipFill>
-        <p:spPr>
-          <a:xfrm>
-            <a:off x="2164367" y="2683784"/>
-            <a:ext cx="1027038" cy="1027038"/>
-          </a:xfrm>
-          <a:prstGeom prst="rect">
-            <a:avLst/>
-          </a:prstGeom>
-        </p:spPr>
-      </p:pic>
-      <p:pic>
-        <p:nvPicPr>
-          <p:cNvPr id="7" name="Picture 6"/>
-          <p:cNvPicPr>
-            <a:picLocks noChangeAspect="1"/>
-          </p:cNvPicPr>
-          <p:nvPr/>
-        </p:nvPicPr>
-        <p:blipFill>
-          <a:blip r:embed="rId5" cstate="print">
-            <a:extLst>
-              <a:ext uri="{28A0092B-C50C-407E-A947-70E740481C1C}">
-                <a14:useLocalDpi xmlns:a14="http://schemas.microsoft.com/office/drawing/2010/main" val="0"/>
-              </a:ext>
-            </a:extLst>
-          </a:blip>
-          <a:stretch>
-            <a:fillRect/>
-          </a:stretch>
-        </p:blipFill>
-        <p:spPr>
-          <a:xfrm>
-            <a:off x="3377915" y="2849533"/>
-            <a:ext cx="1488081" cy="837046"/>
-          </a:xfrm>
-          <a:prstGeom prst="rect">
-            <a:avLst/>
-          </a:prstGeom>
-        </p:spPr>
-      </p:pic>
-      <p:pic>
-        <p:nvPicPr>
-          <p:cNvPr id="8" name="Picture 7"/>
-          <p:cNvPicPr>
-            <a:picLocks noChangeAspect="1"/>
-          </p:cNvPicPr>
-          <p:nvPr/>
-        </p:nvPicPr>
-        <p:blipFill>
-          <a:blip r:embed="rId6">
-            <a:extLst>
-              <a:ext uri="{28A0092B-C50C-407E-A947-70E740481C1C}">
-                <a14:useLocalDpi xmlns:a14="http://schemas.microsoft.com/office/drawing/2010/main" val="0"/>
-              </a:ext>
-            </a:extLst>
-          </a:blip>
-          <a:stretch>
-            <a:fillRect/>
-          </a:stretch>
-        </p:blipFill>
-        <p:spPr>
-          <a:xfrm>
-            <a:off x="6660988" y="2793724"/>
-            <a:ext cx="1051651" cy="975445"/>
-          </a:xfrm>
-          <a:prstGeom prst="rect">
-            <a:avLst/>
-          </a:prstGeom>
-        </p:spPr>
-      </p:pic>
-      <p:pic>
-        <p:nvPicPr>
-          <p:cNvPr id="9" name="Picture 8"/>
-          <p:cNvPicPr>
-            <a:picLocks noChangeAspect="1"/>
-          </p:cNvPicPr>
-          <p:nvPr/>
-        </p:nvPicPr>
-        <p:blipFill>
-          <a:blip r:embed="rId7">
-            <a:extLst>
-              <a:ext uri="{28A0092B-C50C-407E-A947-70E740481C1C}">
-                <a14:useLocalDpi xmlns:a14="http://schemas.microsoft.com/office/drawing/2010/main" val="0"/>
-              </a:ext>
-            </a:extLst>
-          </a:blip>
-          <a:stretch>
-            <a:fillRect/>
-          </a:stretch>
-        </p:blipFill>
-        <p:spPr>
-          <a:xfrm>
-            <a:off x="7989601" y="3085850"/>
-            <a:ext cx="1684166" cy="388654"/>
-          </a:xfrm>
-          <a:prstGeom prst="rect">
-            <a:avLst/>
-          </a:prstGeom>
-        </p:spPr>
-      </p:pic>
-      <p:pic>
-        <p:nvPicPr>
-          <p:cNvPr id="10" name="Picture 9"/>
-          <p:cNvPicPr>
-            <a:picLocks noChangeAspect="1"/>
-          </p:cNvPicPr>
-          <p:nvPr/>
-        </p:nvPicPr>
-        <p:blipFill>
-          <a:blip r:embed="rId8">
-            <a:extLst>
-              <a:ext uri="{28A0092B-C50C-407E-A947-70E740481C1C}">
-                <a14:useLocalDpi xmlns:a14="http://schemas.microsoft.com/office/drawing/2010/main" val="0"/>
-              </a:ext>
-            </a:extLst>
-          </a:blip>
-          <a:stretch>
-            <a:fillRect/>
-          </a:stretch>
-        </p:blipFill>
-        <p:spPr>
-          <a:xfrm>
-            <a:off x="5052506" y="2783875"/>
-            <a:ext cx="1421972" cy="975445"/>
-          </a:xfrm>
-          <a:prstGeom prst="rect">
-            <a:avLst/>
-          </a:prstGeom>
-        </p:spPr>
-      </p:pic>
-      <p:pic>
-        <p:nvPicPr>
-          <p:cNvPr id="11" name="Picture 10"/>
-          <p:cNvPicPr>
-            <a:picLocks noChangeAspect="1"/>
-          </p:cNvPicPr>
-          <p:nvPr/>
-        </p:nvPicPr>
-        <p:blipFill>
-          <a:blip r:embed="rId9" cstate="print">
-            <a:extLst>
-              <a:ext uri="{28A0092B-C50C-407E-A947-70E740481C1C}">
-                <a14:useLocalDpi xmlns:a14="http://schemas.microsoft.com/office/drawing/2010/main" val="0"/>
-              </a:ext>
-            </a:extLst>
-          </a:blip>
-          <a:stretch>
-            <a:fillRect/>
-          </a:stretch>
-        </p:blipFill>
-        <p:spPr>
-          <a:xfrm>
-            <a:off x="1057006" y="3961153"/>
-            <a:ext cx="872633" cy="926947"/>
-          </a:xfrm>
-          <a:prstGeom prst="rect">
-            <a:avLst/>
-          </a:prstGeom>
-        </p:spPr>
-      </p:pic>
-      <p:pic>
-        <p:nvPicPr>
-          <p:cNvPr id="12" name="Picture 11"/>
-          <p:cNvPicPr>
-            <a:picLocks noChangeAspect="1"/>
-          </p:cNvPicPr>
-          <p:nvPr/>
-        </p:nvPicPr>
-        <p:blipFill>
-          <a:blip r:embed="rId10" cstate="print">
-            <a:extLst>
-              <a:ext uri="{28A0092B-C50C-407E-A947-70E740481C1C}">
-                <a14:useLocalDpi xmlns:a14="http://schemas.microsoft.com/office/drawing/2010/main" val="0"/>
-              </a:ext>
-            </a:extLst>
-          </a:blip>
-          <a:stretch>
-            <a:fillRect/>
-          </a:stretch>
-        </p:blipFill>
-        <p:spPr>
-          <a:xfrm>
-            <a:off x="2150685" y="3977736"/>
-            <a:ext cx="918048" cy="918048"/>
-          </a:xfrm>
-          <a:prstGeom prst="rect">
-            <a:avLst/>
-          </a:prstGeom>
-        </p:spPr>
-      </p:pic>
-      <p:pic>
-        <p:nvPicPr>
-          <p:cNvPr id="13" name="Picture 12"/>
-          <p:cNvPicPr>
-            <a:picLocks noChangeAspect="1"/>
-          </p:cNvPicPr>
-          <p:nvPr/>
-        </p:nvPicPr>
-        <p:blipFill>
-          <a:blip r:embed="rId11">
-            <a:extLst>
-              <a:ext uri="{28A0092B-C50C-407E-A947-70E740481C1C}">
-                <a14:useLocalDpi xmlns:a14="http://schemas.microsoft.com/office/drawing/2010/main" val="0"/>
-              </a:ext>
-            </a:extLst>
-          </a:blip>
-          <a:stretch>
-            <a:fillRect/>
-          </a:stretch>
-        </p:blipFill>
-        <p:spPr>
-          <a:xfrm>
-            <a:off x="3279404" y="3962017"/>
-            <a:ext cx="969754" cy="969754"/>
-          </a:xfrm>
-          <a:prstGeom prst="rect">
-            <a:avLst/>
-          </a:prstGeom>
-        </p:spPr>
-      </p:pic>
-      <p:pic>
-        <p:nvPicPr>
-          <p:cNvPr id="14" name="Picture 13"/>
-          <p:cNvPicPr>
-            <a:picLocks noChangeAspect="1"/>
-          </p:cNvPicPr>
-          <p:nvPr/>
-        </p:nvPicPr>
-        <p:blipFill>
-          <a:blip r:embed="rId12">
-            <a:extLst>
-              <a:ext uri="{28A0092B-C50C-407E-A947-70E740481C1C}">
-                <a14:useLocalDpi xmlns:a14="http://schemas.microsoft.com/office/drawing/2010/main" val="0"/>
-              </a:ext>
-            </a:extLst>
-          </a:blip>
-          <a:stretch>
-            <a:fillRect/>
-          </a:stretch>
-        </p:blipFill>
-        <p:spPr>
-          <a:xfrm>
-            <a:off x="4459829" y="3664409"/>
-            <a:ext cx="586050" cy="1302335"/>
-          </a:xfrm>
-          <a:prstGeom prst="rect">
-            <a:avLst/>
-          </a:prstGeom>
-        </p:spPr>
-      </p:pic>
-      <p:pic>
-        <p:nvPicPr>
-          <p:cNvPr id="15" name="Picture 14"/>
-          <p:cNvPicPr>
-            <a:picLocks noChangeAspect="1"/>
-          </p:cNvPicPr>
-          <p:nvPr/>
-        </p:nvPicPr>
-        <p:blipFill>
-          <a:blip r:embed="rId13" cstate="print">
-            <a:extLst>
-              <a:ext uri="{28A0092B-C50C-407E-A947-70E740481C1C}">
-                <a14:useLocalDpi xmlns:a14="http://schemas.microsoft.com/office/drawing/2010/main" val="0"/>
-              </a:ext>
-            </a:extLst>
-          </a:blip>
-          <a:stretch>
-            <a:fillRect/>
-          </a:stretch>
-        </p:blipFill>
-        <p:spPr>
-          <a:xfrm>
-            <a:off x="5187601" y="3922025"/>
-            <a:ext cx="1089190" cy="1089190"/>
-          </a:xfrm>
-          <a:prstGeom prst="rect">
-            <a:avLst/>
-          </a:prstGeom>
-        </p:spPr>
-      </p:pic>
-      <p:pic>
-        <p:nvPicPr>
-          <p:cNvPr id="16" name="Picture 15"/>
-          <p:cNvPicPr>
-            <a:picLocks noChangeAspect="1"/>
-          </p:cNvPicPr>
-          <p:nvPr/>
-        </p:nvPicPr>
-        <p:blipFill>
-          <a:blip r:embed="rId14" cstate="print">
-            <a:extLst>
-              <a:ext uri="{28A0092B-C50C-407E-A947-70E740481C1C}">
-                <a14:useLocalDpi xmlns:a14="http://schemas.microsoft.com/office/drawing/2010/main" val="0"/>
-              </a:ext>
-            </a:extLst>
-          </a:blip>
-          <a:stretch>
-            <a:fillRect/>
-          </a:stretch>
-        </p:blipFill>
-        <p:spPr>
-          <a:xfrm>
-            <a:off x="6309360" y="4191198"/>
-            <a:ext cx="1560811" cy="696902"/>
-          </a:xfrm>
-          <a:prstGeom prst="rect">
-            <a:avLst/>
-          </a:prstGeom>
-        </p:spPr>
-      </p:pic>
-      <p:pic>
-        <p:nvPicPr>
-          <p:cNvPr id="17" name="Picture 16"/>
-          <p:cNvPicPr>
-            <a:picLocks noChangeAspect="1"/>
-          </p:cNvPicPr>
-          <p:nvPr/>
-        </p:nvPicPr>
-        <p:blipFill>
-          <a:blip r:embed="rId15">
-            <a:extLst>
-              <a:ext uri="{28A0092B-C50C-407E-A947-70E740481C1C}">
-                <a14:useLocalDpi xmlns:a14="http://schemas.microsoft.com/office/drawing/2010/main" val="0"/>
-              </a:ext>
-            </a:extLst>
-          </a:blip>
-          <a:stretch>
-            <a:fillRect/>
-          </a:stretch>
-        </p:blipFill>
-        <p:spPr>
-          <a:xfrm>
-            <a:off x="8084839" y="4052575"/>
-            <a:ext cx="1165337" cy="835525"/>
-          </a:xfrm>
-          <a:prstGeom prst="rect">
-            <a:avLst/>
-          </a:prstGeom>
-        </p:spPr>
-      </p:pic>
-      <p:pic>
-        <p:nvPicPr>
-          <p:cNvPr id="18" name="Picture 17"/>
-          <p:cNvPicPr>
-            <a:picLocks noChangeAspect="1"/>
-          </p:cNvPicPr>
-          <p:nvPr/>
-        </p:nvPicPr>
-        <p:blipFill>
-          <a:blip r:embed="rId16">
-            <a:extLst>
-              <a:ext uri="{28A0092B-C50C-407E-A947-70E740481C1C}">
-                <a14:useLocalDpi xmlns:a14="http://schemas.microsoft.com/office/drawing/2010/main" val="0"/>
-              </a:ext>
-            </a:extLst>
-          </a:blip>
-          <a:stretch>
-            <a:fillRect/>
-          </a:stretch>
-        </p:blipFill>
-        <p:spPr>
-          <a:xfrm>
-            <a:off x="10107840" y="3374712"/>
-            <a:ext cx="1665996" cy="1094626"/>
-          </a:xfrm>
-          <a:prstGeom prst="rect">
-            <a:avLst/>
-          </a:prstGeom>
-        </p:spPr>
-      </p:pic>
+        <p:txBody>
+          <a:bodyPr vert="horz" lIns="91440" tIns="45720" rIns="91440" bIns="45720" rtlCol="0" anchor="ctr">
+            <a:normAutofit/>
+          </a:bodyPr>
+          <a:lstStyle>
+            <a:lvl1pPr algn="l" defTabSz="914400" rtl="0" eaLnBrk="1" latinLnBrk="0" hangingPunct="1">
+              <a:lnSpc>
+                <a:spcPct val="90000"/>
+              </a:lnSpc>
+              <a:spcBef>
+                <a:spcPct val="0"/>
+              </a:spcBef>
+              <a:buNone/>
+              <a:defRPr sz="4400" kern="1200">
+                <a:solidFill>
+                  <a:schemeClr val="tx1"/>
+                </a:solidFill>
+                <a:latin typeface="+mj-lt"/>
+                <a:ea typeface="+mj-ea"/>
+                <a:cs typeface="+mj-cs"/>
+              </a:defRPr>
+            </a:lvl1pPr>
+          </a:lstStyle>
+          <a:p>
+            <a:pPr algn="ctr"/>
+            <a:r>
+              <a:rPr lang="lt-LT" dirty="0" smtClean="0"/>
+              <a:t>Tikslas ir uždaviniai</a:t>
+            </a:r>
+            <a:endParaRPr lang="lt-LT" sz="4800" dirty="0"/>
+          </a:p>
+        </p:txBody>
+      </p:sp>
     </p:spTree>
     <p:extLst>
       <p:ext uri="{BB962C8B-B14F-4D97-AF65-F5344CB8AC3E}">
-        <p14:creationId xmlns:p14="http://schemas.microsoft.com/office/powerpoint/2010/main" val="3857338428"/>
+        <p14:creationId xmlns:p14="http://schemas.microsoft.com/office/powerpoint/2010/main" val="53002530"/>
       </p:ext>
     </p:extLst>
   </p:cSld>
@@ -5368,113 +4939,27 @@
             <p:ph type="title"/>
           </p:nvPr>
         </p:nvSpPr>
-        <p:spPr/>
-        <p:txBody>
-          <a:bodyPr/>
-          <a:lstStyle/>
-          <a:p>
-            <a:pPr algn="ctr"/>
-            <a:r>
-              <a:rPr lang="lt-LT" dirty="0" smtClean="0"/>
-              <a:t>Tikslas ir uždaviniai</a:t>
-            </a:r>
-            <a:endParaRPr lang="lt-LT" dirty="0"/>
-          </a:p>
-        </p:txBody>
-      </p:sp>
-      <p:sp>
-        <p:nvSpPr>
-          <p:cNvPr id="3" name="Content Placeholder 2"/>
-          <p:cNvSpPr>
-            <a:spLocks noGrp="1"/>
-          </p:cNvSpPr>
-          <p:nvPr>
-            <p:ph idx="1"/>
-          </p:nvPr>
-        </p:nvSpPr>
         <p:spPr>
           <a:xfrm>
-            <a:off x="320041" y="1809583"/>
-            <a:ext cx="11576304" cy="4351338"/>
+            <a:off x="0" y="0"/>
+            <a:ext cx="12192000" cy="1556657"/>
           </a:xfrm>
         </p:spPr>
         <p:txBody>
           <a:bodyPr/>
           <a:lstStyle/>
           <a:p>
-            <a:pPr marL="0" indent="0">
-              <a:buNone/>
-            </a:pPr>
-            <a:r>
-              <a:rPr lang="lt-LT" b="1" dirty="0"/>
-              <a:t>Tikslas</a:t>
-            </a:r>
-            <a:r>
-              <a:rPr lang="lt-LT" dirty="0"/>
-              <a:t> - įgyvendinti vidinių įmonės užsakymų automatizavimo </a:t>
-            </a:r>
+            <a:pPr algn="ctr"/>
             <a:r>
               <a:rPr lang="lt-LT" dirty="0" smtClean="0"/>
-              <a:t>sistemą</a:t>
-            </a:r>
-            <a:r>
-              <a:rPr lang="lt-LT" baseline="30000" dirty="0" smtClean="0"/>
-              <a:t>1</a:t>
-            </a:r>
-            <a:r>
+              <a:t>Rezultatai</a:t>
+            </a:r>
+            <a:br>
               <a:rPr lang="lt-LT" dirty="0" smtClean="0"/>
-              <a:t> </a:t>
-            </a:r>
-            <a:r>
-              <a:rPr lang="lt-LT" dirty="0"/>
-              <a:t>„</a:t>
-            </a:r>
-            <a:r>
-              <a:rPr lang="lt-LT" dirty="0" smtClean="0"/>
-              <a:t>TITO“</a:t>
-            </a:r>
-          </a:p>
-          <a:p>
-            <a:pPr marL="0" indent="0">
-              <a:buNone/>
-            </a:pPr>
-            <a:r>
-              <a:rPr lang="lt-LT" b="1" dirty="0" smtClean="0"/>
-              <a:t>Uždaviniai</a:t>
-            </a:r>
-            <a:r>
-              <a:rPr lang="lt-LT" dirty="0" smtClean="0"/>
-              <a:t>:</a:t>
-            </a:r>
-          </a:p>
-          <a:p>
-            <a:pPr marL="514350" indent="-514350">
-              <a:buFont typeface="+mj-lt"/>
-              <a:buAutoNum type="arabicPeriod"/>
-            </a:pPr>
-            <a:r>
-              <a:rPr lang="lt-LT" dirty="0" smtClean="0"/>
-              <a:t>Suprogramuoti sistemos funkcionalumus</a:t>
-            </a:r>
-          </a:p>
-          <a:p>
-            <a:pPr marL="514350" indent="-514350">
-              <a:buFont typeface="+mj-lt"/>
-              <a:buAutoNum type="arabicPeriod"/>
-            </a:pPr>
-            <a:r>
-              <a:rPr lang="lt-LT" dirty="0" smtClean="0"/>
-              <a:t>Paruošti vienetų bei integracinius testus</a:t>
-            </a:r>
-          </a:p>
-          <a:p>
-            <a:pPr marL="514350" indent="-514350">
-              <a:buFont typeface="+mj-lt"/>
-              <a:buAutoNum type="arabicPeriod"/>
-            </a:pPr>
-            <a:r>
-              <a:rPr lang="lt-LT" dirty="0" smtClean="0"/>
-              <a:t>Eigoje derinti sistemos reikalavimus su verslo analitikais bei kliento atstovais</a:t>
+            </a:br>
+            <a:r>
+              <a:rPr lang="lt-LT" sz="3200" dirty="0" smtClean="0"/>
+              <a:t>Naudotojų problemos tapatybės valdyme</a:t>
             </a:r>
             <a:endParaRPr lang="lt-LT" dirty="0"/>
           </a:p>
@@ -5482,40 +4967,63 @@
       </p:sp>
       <p:sp>
         <p:nvSpPr>
-          <p:cNvPr id="6" name="Footer Placeholder 5"/>
-          <p:cNvSpPr>
-            <a:spLocks noGrp="1"/>
-          </p:cNvSpPr>
-          <p:nvPr>
-            <p:ph type="ftr" sz="quarter" idx="11"/>
+          <p:cNvPr id="3" name="Content Placeholder 2"/>
+          <p:cNvSpPr>
+            <a:spLocks noGrp="1"/>
+          </p:cNvSpPr>
+          <p:nvPr>
+            <p:ph idx="1"/>
           </p:nvPr>
         </p:nvSpPr>
         <p:spPr>
           <a:xfrm>
-            <a:off x="320040" y="6279816"/>
-            <a:ext cx="4325111" cy="365125"/>
+            <a:off x="838200" y="1858282"/>
+            <a:ext cx="10515600" cy="4351338"/>
           </a:xfrm>
         </p:spPr>
         <p:txBody>
           <a:bodyPr/>
           <a:lstStyle/>
           <a:p>
-            <a:r>
-              <a:rPr lang="pt-BR" sz="1600" baseline="30000" dirty="0" smtClean="0"/>
-              <a:t>1</a:t>
-            </a:r>
-            <a:r>
-              <a:rPr lang="pt-BR" sz="1600" dirty="0" smtClean="0"/>
-              <a:t> sistemos aprašymas pateikiamas 1-ame priede</a:t>
-            </a:r>
-            <a:endParaRPr lang="lt-LT" sz="1600" dirty="0"/>
+            <a:pPr marL="0" indent="0">
+              <a:buNone/>
+            </a:pPr>
+            <a:r>
+              <a:rPr lang="lt-LT" dirty="0" smtClean="0"/>
+              <a:t>Apžvelgus internete naudojamus skaitmeninės tapatybės valdymo modelius, apibendrintos naudotojams kylančios problemos:</a:t>
+            </a:r>
+          </a:p>
+          <a:p>
+            <a:pPr marL="0" indent="0">
+              <a:buNone/>
+            </a:pPr>
+            <a:endParaRPr lang="lt-LT" dirty="0" smtClean="0"/>
+          </a:p>
+          <a:p>
+            <a:r>
+              <a:rPr lang="lt-LT" dirty="0" smtClean="0"/>
+              <a:t>Kontrolės trūkumas</a:t>
+            </a:r>
+          </a:p>
+          <a:p>
+            <a:r>
+              <a:rPr lang="lt-LT" dirty="0" smtClean="0"/>
+              <a:t>Reikalingas didelis pasitikėjimas paslaugų kūrėjais</a:t>
+            </a:r>
+          </a:p>
+          <a:p>
+            <a:r>
+              <a:rPr lang="lt-LT" dirty="0" smtClean="0"/>
+              <a:t>Priklausomybė nuo tapatybės tiekėjų</a:t>
+            </a:r>
+            <a:endParaRPr lang="lt-LT" dirty="0"/>
           </a:p>
         </p:txBody>
       </p:sp>
     </p:spTree>
     <p:extLst>
       <p:ext uri="{BB962C8B-B14F-4D97-AF65-F5344CB8AC3E}">
-        <p14:creationId xmlns:p14="http://schemas.microsoft.com/office/powerpoint/2010/main" val="2860756761"/>
+        <p14:creationId xmlns:p14="http://schemas.microsoft.com/office/powerpoint/2010/main" val="1319609660"/>
       </p:ext>
     </p:extLst>
   </p:cSld>
@@ -5551,132 +5059,72 @@
       </p:grpSpPr>
       <p:sp>
         <p:nvSpPr>
-          <p:cNvPr id="2" name="Title 1"/>
+          <p:cNvPr id="3" name="Content Placeholder 2"/>
+          <p:cNvSpPr>
+            <a:spLocks noGrp="1"/>
+          </p:cNvSpPr>
+          <p:nvPr>
+            <p:ph idx="1"/>
+          </p:nvPr>
+        </p:nvSpPr>
+        <p:spPr/>
+        <p:txBody>
+          <a:bodyPr/>
+          <a:lstStyle/>
+          <a:p>
+            <a:pPr marL="0" indent="0">
+              <a:buNone/>
+            </a:pPr>
+            <a:r>
+              <a:rPr lang="lt-LT" dirty="0" smtClean="0"/>
+              <a:t>Pristačius blokų grandinės technologiją ir ją naudojančius skaitmeninės tapatybės projektus, nustatyta, kad:</a:t>
+            </a:r>
+          </a:p>
+          <a:p>
+            <a:endParaRPr lang="lt-LT" dirty="0"/>
+          </a:p>
+        </p:txBody>
+      </p:sp>
+      <p:sp>
+        <p:nvSpPr>
+          <p:cNvPr id="4" name="Title 1"/>
           <p:cNvSpPr>
             <a:spLocks noGrp="1"/>
           </p:cNvSpPr>
           <p:nvPr>
             <p:ph type="title"/>
-          </p:nvPr>
-        </p:nvSpPr>
-        <p:spPr/>
-        <p:txBody>
-          <a:bodyPr/>
-          <a:lstStyle/>
-          <a:p>
-            <a:pPr algn="ctr"/>
-            <a:r>
-              <a:rPr lang="en-US" dirty="0" err="1" smtClean="0"/>
-              <a:t>Vidini</a:t>
-            </a:r>
-            <a:r>
-              <a:rPr lang="lt-LT" dirty="0" smtClean="0"/>
-              <a:t>ų užsakymų sistema „TITO“</a:t>
-            </a:r>
-            <a:endParaRPr lang="lt-LT" dirty="0"/>
-          </a:p>
-        </p:txBody>
-      </p:sp>
-      <p:sp>
-        <p:nvSpPr>
-          <p:cNvPr id="3" name="Content Placeholder 2"/>
-          <p:cNvSpPr>
-            <a:spLocks noGrp="1"/>
-          </p:cNvSpPr>
-          <p:nvPr>
-            <p:ph idx="1"/>
           </p:nvPr>
         </p:nvSpPr>
         <p:spPr>
           <a:xfrm>
-            <a:off x="217714" y="1847396"/>
-            <a:ext cx="10515600" cy="4351338"/>
+            <a:off x="0" y="0"/>
+            <a:ext cx="12192000" cy="1556657"/>
           </a:xfrm>
         </p:spPr>
         <p:txBody>
           <a:bodyPr/>
           <a:lstStyle/>
           <a:p>
-            <a:pPr marL="0" indent="0">
-              <a:buNone/>
-            </a:pPr>
-            <a:r>
-              <a:rPr lang="lt-LT" b="1" dirty="0" smtClean="0"/>
-              <a:t>Paskirtis: </a:t>
-            </a:r>
+            <a:pPr algn="ctr"/>
             <a:r>
               <a:rPr lang="lt-LT" dirty="0" smtClean="0"/>
-              <a:t>užsakyti reikalingus daiktus įmonės darbuotojams</a:t>
-            </a:r>
-          </a:p>
-          <a:p>
-            <a:r>
-              <a:rPr lang="lt-LT" dirty="0" smtClean="0"/>
-              <a:t>Užsakymų būsenos</a:t>
-            </a:r>
-          </a:p>
-          <a:p>
-            <a:r>
-              <a:rPr lang="lt-LT" dirty="0" smtClean="0"/>
-              <a:t>Skirtingos darbuotojų</a:t>
+              <a:t>Rezultatai</a:t>
             </a:r>
             <a:br>
               <a:rPr lang="lt-LT" dirty="0" smtClean="0"/>
             </a:br>
             <a:r>
-              <a:rPr lang="lt-LT" dirty="0" smtClean="0"/>
-              <a:t>rolės</a:t>
-            </a:r>
-          </a:p>
-          <a:p>
-            <a:r>
-              <a:rPr lang="lt-LT" dirty="0" smtClean="0"/>
-              <a:t>Darbuotojų, vykdytojų</a:t>
-            </a:r>
-            <a:br>
-              <a:rPr lang="lt-LT" dirty="0" smtClean="0"/>
-            </a:br>
-            <a:r>
-              <a:rPr lang="lt-LT" dirty="0" smtClean="0"/>
-              <a:t>informavimas</a:t>
-            </a:r>
-          </a:p>
-        </p:txBody>
-      </p:sp>
-      <p:pic>
-        <p:nvPicPr>
-          <p:cNvPr id="5" name="Picture 4"/>
-          <p:cNvPicPr>
-            <a:picLocks noChangeAspect="1"/>
-          </p:cNvPicPr>
-          <p:nvPr/>
-        </p:nvPicPr>
-        <p:blipFill>
-          <a:blip r:embed="rId3">
-            <a:extLst>
-              <a:ext uri="{28A0092B-C50C-407E-A947-70E740481C1C}">
-                <a14:useLocalDpi xmlns:a14="http://schemas.microsoft.com/office/drawing/2010/main" val="0"/>
-              </a:ext>
-            </a:extLst>
-          </a:blip>
-          <a:stretch>
-            <a:fillRect/>
-          </a:stretch>
-        </p:blipFill>
-        <p:spPr>
-          <a:xfrm>
-            <a:off x="3736522" y="2433893"/>
-            <a:ext cx="8584325" cy="4130194"/>
-          </a:xfrm>
-          <a:prstGeom prst="rect">
-            <a:avLst/>
-          </a:prstGeom>
-        </p:spPr>
-      </p:pic>
+              <a:rPr lang="lt-LT" sz="3200" dirty="0" smtClean="0"/>
+              <a:t>Blokų grandinės savybės bei ją naudojantys projektai</a:t>
+            </a:r>
+            <a:endParaRPr lang="lt-LT" dirty="0"/>
+          </a:p>
+        </p:txBody>
+      </p:sp>
     </p:spTree>
     <p:extLst>
       <p:ext uri="{BB962C8B-B14F-4D97-AF65-F5344CB8AC3E}">
-        <p14:creationId xmlns:p14="http://schemas.microsoft.com/office/powerpoint/2010/main" val="2682851940"/>
+        <p14:creationId xmlns:p14="http://schemas.microsoft.com/office/powerpoint/2010/main" val="1153521948"/>
       </p:ext>
     </p:extLst>
   </p:cSld>
@@ -5720,65 +5168,51 @@
             <p:ph type="title"/>
           </p:nvPr>
         </p:nvSpPr>
+        <p:spPr/>
+        <p:txBody>
+          <a:bodyPr/>
+          <a:lstStyle/>
+          <a:p>
+            <a:pPr algn="ctr"/>
+            <a:r>
+              <a:rPr lang="lt-LT" dirty="0" smtClean="0"/>
+              <a:t>Išvados</a:t>
+            </a:r>
+            <a:endParaRPr lang="lt-LT" dirty="0"/>
+          </a:p>
+        </p:txBody>
+      </p:sp>
+      <p:sp>
+        <p:nvSpPr>
+          <p:cNvPr id="3" name="Content Placeholder 2"/>
+          <p:cNvSpPr>
+            <a:spLocks noGrp="1"/>
+          </p:cNvSpPr>
+          <p:nvPr>
+            <p:ph idx="1"/>
+          </p:nvPr>
+        </p:nvSpPr>
         <p:spPr>
           <a:xfrm>
-            <a:off x="766037" y="112295"/>
-            <a:ext cx="10515600" cy="1325563"/>
+            <a:off x="320041" y="1809583"/>
+            <a:ext cx="11576304" cy="4351338"/>
           </a:xfrm>
         </p:spPr>
         <p:txBody>
           <a:bodyPr/>
           <a:lstStyle/>
           <a:p>
-            <a:pPr algn="ctr"/>
-            <a:r>
-              <a:rPr lang="lt-LT" dirty="0" smtClean="0"/>
-              <a:t>Pagrindiniai atlikti darbai</a:t>
-            </a:r>
-            <a:br>
-              <a:rPr lang="lt-LT" dirty="0" smtClean="0"/>
-            </a:br>
-            <a:r>
-              <a:rPr lang="lt-LT" sz="3600" dirty="0" smtClean="0"/>
-              <a:t>Integracija su JIRA</a:t>
-            </a:r>
+            <a:pPr marL="0" indent="0">
+              <a:buNone/>
+            </a:pPr>
             <a:endParaRPr lang="lt-LT" dirty="0"/>
           </a:p>
         </p:txBody>
       </p:sp>
-      <p:pic>
-        <p:nvPicPr>
-          <p:cNvPr id="4" name="Content Placeholder 3"/>
-          <p:cNvPicPr>
-            <a:picLocks noGrp="1" noChangeAspect="1"/>
-          </p:cNvPicPr>
-          <p:nvPr>
-            <p:ph idx="1"/>
-          </p:nvPr>
-        </p:nvPicPr>
-        <p:blipFill>
-          <a:blip r:embed="rId2">
-            <a:extLst>
-              <a:ext uri="{28A0092B-C50C-407E-A947-70E740481C1C}">
-                <a14:useLocalDpi xmlns:a14="http://schemas.microsoft.com/office/drawing/2010/main" val="0"/>
-              </a:ext>
-            </a:extLst>
-          </a:blip>
-          <a:stretch>
-            <a:fillRect/>
-          </a:stretch>
-        </p:blipFill>
-        <p:spPr>
-          <a:xfrm>
-            <a:off x="2408175" y="1325563"/>
-            <a:ext cx="7231324" cy="5532437"/>
-          </a:xfrm>
-        </p:spPr>
-      </p:pic>
     </p:spTree>
     <p:extLst>
       <p:ext uri="{BB962C8B-B14F-4D97-AF65-F5344CB8AC3E}">
-        <p14:creationId xmlns:p14="http://schemas.microsoft.com/office/powerpoint/2010/main" val="3069480608"/>
+        <p14:creationId xmlns:p14="http://schemas.microsoft.com/office/powerpoint/2010/main" val="2860756761"/>
       </p:ext>
     </p:extLst>
   </p:cSld>
@@ -5814,7 +5248,7 @@
       </p:grpSpPr>
       <p:sp>
         <p:nvSpPr>
-          <p:cNvPr id="4" name="Title 1"/>
+          <p:cNvPr id="5" name="Title 1"/>
           <p:cNvSpPr txBox="1">
             <a:spLocks/>
           </p:cNvSpPr>
@@ -5822,8 +5256,8 @@
         </p:nvSpPr>
         <p:spPr>
           <a:xfrm>
-            <a:off x="766037" y="112295"/>
-            <a:ext cx="10515600" cy="1325563"/>
+            <a:off x="0" y="0"/>
+            <a:ext cx="12192000" cy="1325563"/>
           </a:xfrm>
           <a:prstGeom prst="rect">
             <a:avLst/>
@@ -5856,58 +5290,53 @@
             <a:pPr algn="ctr"/>
             <a:r>
               <a:rPr lang="lt-LT" dirty="0" smtClean="0"/>
-              <a:t>Pagrindiniai atlikti darbai</a:t>
-            </a:r>
-            <a:br>
-              <a:rPr lang="lt-LT" dirty="0" smtClean="0"/>
-            </a:br>
-            <a:r>
-              <a:rPr lang="lt-LT" sz="3600" dirty="0" smtClean="0"/>
-              <a:t>Integracija su OpenLDAP bei Active Directory</a:t>
-            </a:r>
-            <a:endParaRPr lang="lt-LT" dirty="0"/>
+              <a:t>Blokų grandinės nekintamumas</a:t>
+            </a:r>
+            <a:endParaRPr lang="lt-LT" sz="4800" dirty="0"/>
           </a:p>
         </p:txBody>
       </p:sp>
       <p:pic>
         <p:nvPicPr>
-          <p:cNvPr id="5" name="Content Placeholder 3"/>
+          <p:cNvPr id="6" name="Picture 5"/>
           <p:cNvPicPr>
-            <a:picLocks noGrp="1" noChangeAspect="1"/>
+            <a:picLocks noChangeAspect="1"/>
           </p:cNvPicPr>
-          <p:nvPr>
-            <p:ph idx="1"/>
-          </p:nvPr>
+          <p:nvPr/>
         </p:nvPicPr>
         <p:blipFill>
-          <a:blip r:embed="rId2">
-            <a:extLst>
-              <a:ext uri="{28A0092B-C50C-407E-A947-70E740481C1C}">
-                <a14:useLocalDpi xmlns:a14="http://schemas.microsoft.com/office/drawing/2010/main" val="0"/>
-              </a:ext>
-            </a:extLst>
-          </a:blip>
+          <a:blip r:embed="rId3"/>
           <a:stretch>
             <a:fillRect/>
           </a:stretch>
         </p:blipFill>
         <p:spPr>
           <a:xfrm>
-            <a:off x="593404" y="1437858"/>
-            <a:ext cx="10510526" cy="5372047"/>
+            <a:off x="2111148" y="1481819"/>
+            <a:ext cx="7969704" cy="4441782"/>
           </a:xfrm>
+          <a:prstGeom prst="rect">
+            <a:avLst/>
+          </a:prstGeom>
         </p:spPr>
       </p:pic>
     </p:spTree>
     <p:extLst>
       <p:ext uri="{BB962C8B-B14F-4D97-AF65-F5344CB8AC3E}">
-        <p14:creationId xmlns:p14="http://schemas.microsoft.com/office/powerpoint/2010/main" val="4173433898"/>
+        <p14:creationId xmlns:p14="http://schemas.microsoft.com/office/powerpoint/2010/main" val="1127709529"/>
       </p:ext>
     </p:extLst>
   </p:cSld>
   <p:clrMapOvr>
     <a:masterClrMapping/>
   </p:clrMapOvr>
+  <p:timing>
+    <p:tnLst>
+      <p:par>
+        <p:cTn id="1" dur="indefinite" restart="never" nodeType="tmRoot"/>
+      </p:par>
+    </p:tnLst>
+  </p:timing>
 </p:sld>
 </file>
 
@@ -5930,56 +5359,23 @@
       </p:grpSpPr>
       <p:sp>
         <p:nvSpPr>
-          <p:cNvPr id="4" name="Title 1"/>
-          <p:cNvSpPr txBox="1">
-            <a:spLocks/>
-          </p:cNvSpPr>
-          <p:nvPr/>
-        </p:nvSpPr>
-        <p:spPr>
-          <a:xfrm>
-            <a:off x="766037" y="112295"/>
-            <a:ext cx="10515600" cy="1325563"/>
-          </a:xfrm>
-          <a:prstGeom prst="rect">
-            <a:avLst/>
-          </a:prstGeom>
-        </p:spPr>
-        <p:txBody>
-          <a:bodyPr vert="horz" lIns="91440" tIns="45720" rIns="91440" bIns="45720" rtlCol="0" anchor="ctr">
-            <a:normAutofit/>
-          </a:bodyPr>
-          <a:lstStyle>
-            <a:lvl1pPr algn="l" defTabSz="914400" rtl="0" eaLnBrk="1" latinLnBrk="0" hangingPunct="1">
-              <a:lnSpc>
-                <a:spcPct val="90000"/>
-              </a:lnSpc>
-              <a:spcBef>
-                <a:spcPct val="0"/>
-              </a:spcBef>
-              <a:buNone/>
-              <a:defRPr sz="4400" kern="1200">
-                <a:solidFill>
-                  <a:schemeClr val="tx1"/>
-                </a:solidFill>
-                <a:latin typeface="+mj-lt"/>
-                <a:ea typeface="+mj-ea"/>
-                <a:cs typeface="+mj-cs"/>
-              </a:defRPr>
-            </a:lvl1pPr>
-          </a:lstStyle>
+          <p:cNvPr id="2" name="Title 1"/>
+          <p:cNvSpPr>
+            <a:spLocks noGrp="1"/>
+          </p:cNvSpPr>
+          <p:nvPr>
+            <p:ph type="title"/>
+          </p:nvPr>
+        </p:nvSpPr>
+        <p:spPr/>
+        <p:txBody>
+          <a:bodyPr/>
+          <a:lstStyle/>
           <a:p>
             <a:pPr algn="ctr"/>
             <a:r>
               <a:rPr lang="lt-LT" dirty="0" smtClean="0"/>
-              <a:t>Pagrindiniai atlikti darbai</a:t>
-            </a:r>
-            <a:br>
-              <a:rPr lang="lt-LT" dirty="0" smtClean="0"/>
-            </a:br>
-            <a:r>
-              <a:rPr lang="lt-LT" sz="3600" dirty="0" smtClean="0"/>
-              <a:t>Periodiškų užduočių vykdymo mechanizmas</a:t>
+              <a:t>Klausimai</a:t>
             </a:r>
             <a:endParaRPr lang="lt-LT" dirty="0"/>
           </a:p>
@@ -5987,14 +5383,16 @@
       </p:sp>
       <p:pic>
         <p:nvPicPr>
-          <p:cNvPr id="5" name="Picture 4"/>
+          <p:cNvPr id="4" name="Content Placeholder 3"/>
           <p:cNvPicPr>
-            <a:picLocks noChangeAspect="1"/>
+            <a:picLocks noGrp="1" noChangeAspect="1"/>
           </p:cNvPicPr>
-          <p:nvPr/>
+          <p:nvPr>
+            <p:ph idx="1"/>
+          </p:nvPr>
         </p:nvPicPr>
         <p:blipFill>
-          <a:blip r:embed="rId2">
+          <a:blip r:embed="rId2" cstate="print">
             <a:extLst>
               <a:ext uri="{28A0092B-C50C-407E-A947-70E740481C1C}">
                 <a14:useLocalDpi xmlns:a14="http://schemas.microsoft.com/office/drawing/2010/main" val="0"/>
@@ -6007,276 +5405,15 @@
         </p:blipFill>
         <p:spPr>
           <a:xfrm>
-            <a:off x="1754516" y="1437858"/>
-            <a:ext cx="8294359" cy="5396330"/>
+            <a:off x="4261335" y="1690688"/>
+            <a:ext cx="3669329" cy="4891750"/>
           </a:xfrm>
-          <a:prstGeom prst="rect">
-            <a:avLst/>
-          </a:prstGeom>
         </p:spPr>
       </p:pic>
     </p:spTree>
     <p:extLst>
       <p:ext uri="{BB962C8B-B14F-4D97-AF65-F5344CB8AC3E}">
-        <p14:creationId xmlns:p14="http://schemas.microsoft.com/office/powerpoint/2010/main" val="3203002817"/>
-      </p:ext>
-    </p:extLst>
-  </p:cSld>
-  <p:clrMapOvr>
-    <a:masterClrMapping/>
-  </p:clrMapOvr>
-</p:sld>
-</file>
-
-<file path=ppt/slides/slide9.xml><?xml version="1.0" encoding="utf-8"?>
-<p:sld xmlns:a="http://schemas.openxmlformats.org/drawingml/2006/main" xmlns:r="http://schemas.openxmlformats.org/officeDocument/2006/relationships" xmlns:p="http://schemas.openxmlformats.org/presentationml/2006/main">
-  <p:cSld>
-    <p:spTree>
-      <p:nvGrpSpPr>
-        <p:cNvPr id="1" name=""/>
-        <p:cNvGrpSpPr/>
-        <p:nvPr/>
-      </p:nvGrpSpPr>
-      <p:grpSpPr>
-        <a:xfrm>
-          <a:off x="0" y="0"/>
-          <a:ext cx="0" cy="0"/>
-          <a:chOff x="0" y="0"/>
-          <a:chExt cx="0" cy="0"/>
-        </a:xfrm>
-      </p:grpSpPr>
-      <p:sp>
-        <p:nvSpPr>
-          <p:cNvPr id="2" name="Title 1"/>
-          <p:cNvSpPr>
-            <a:spLocks noGrp="1"/>
-          </p:cNvSpPr>
-          <p:nvPr>
-            <p:ph type="title"/>
-          </p:nvPr>
-        </p:nvSpPr>
-        <p:spPr/>
-        <p:txBody>
-          <a:bodyPr/>
-          <a:lstStyle/>
-          <a:p>
-            <a:pPr algn="ctr"/>
-            <a:r>
-              <a:rPr lang="lt-LT" dirty="0" smtClean="0"/>
-              <a:t>Rezultatai</a:t>
-            </a:r>
-            <a:endParaRPr lang="lt-LT" dirty="0"/>
-          </a:p>
-        </p:txBody>
-      </p:sp>
-      <p:sp>
-        <p:nvSpPr>
-          <p:cNvPr id="3" name="Content Placeholder 2"/>
-          <p:cNvSpPr>
-            <a:spLocks noGrp="1"/>
-          </p:cNvSpPr>
-          <p:nvPr>
-            <p:ph idx="1"/>
-          </p:nvPr>
-        </p:nvSpPr>
-        <p:spPr>
-          <a:xfrm>
-            <a:off x="838199" y="1825625"/>
-            <a:ext cx="11039857" cy="4351338"/>
-          </a:xfrm>
-        </p:spPr>
-        <p:txBody>
-          <a:bodyPr>
-            <a:normAutofit fontScale="92500" lnSpcReduction="10000"/>
-          </a:bodyPr>
-          <a:lstStyle/>
-          <a:p>
-            <a:pPr marL="514350" indent="-514350">
-              <a:buFont typeface="+mj-lt"/>
-              <a:buAutoNum type="arabicPeriod"/>
-            </a:pPr>
-            <a:r>
-              <a:rPr lang="lt-LT" dirty="0" smtClean="0"/>
-              <a:t>Įgyvendinta:</a:t>
-            </a:r>
-          </a:p>
-          <a:p>
-            <a:pPr lvl="1"/>
-            <a:r>
-              <a:rPr lang="lt-LT" dirty="0" smtClean="0"/>
-              <a:t>Integracija su </a:t>
-            </a:r>
-            <a:r>
-              <a:rPr lang="lt-LT" i="1" dirty="0" smtClean="0"/>
-              <a:t>JIRA</a:t>
-            </a:r>
-            <a:r>
-              <a:rPr lang="lt-LT" dirty="0" smtClean="0"/>
-              <a:t> per </a:t>
-            </a:r>
-            <a:r>
-              <a:rPr lang="lt-LT" i="1" dirty="0" smtClean="0"/>
-              <a:t>REST API</a:t>
-            </a:r>
-          </a:p>
-          <a:p>
-            <a:pPr lvl="1"/>
-            <a:r>
-              <a:rPr lang="lt-LT" dirty="0" smtClean="0"/>
-              <a:t>Integracija su </a:t>
-            </a:r>
-            <a:r>
-              <a:rPr lang="lt-LT" i="1" dirty="0" smtClean="0"/>
-              <a:t>OpenLDAP</a:t>
-            </a:r>
-            <a:r>
-              <a:rPr lang="lt-LT" dirty="0" smtClean="0"/>
-              <a:t> ir </a:t>
-            </a:r>
-            <a:r>
-              <a:rPr lang="lt-LT" i="1" dirty="0" smtClean="0"/>
-              <a:t>Active Directory </a:t>
-            </a:r>
-            <a:r>
-              <a:rPr lang="lt-LT" dirty="0" smtClean="0"/>
-              <a:t>per </a:t>
-            </a:r>
-            <a:r>
-              <a:rPr lang="lt-LT" i="1" dirty="0" smtClean="0"/>
-              <a:t>LDAP</a:t>
-            </a:r>
-            <a:r>
-              <a:rPr lang="lt-LT" dirty="0" smtClean="0"/>
-              <a:t> protokolą</a:t>
-            </a:r>
-          </a:p>
-          <a:p>
-            <a:pPr lvl="1"/>
-            <a:r>
-              <a:rPr lang="lt-LT" dirty="0" smtClean="0"/>
-              <a:t>Periodiškų darbų vykdymas naudojant </a:t>
-            </a:r>
-            <a:r>
-              <a:rPr lang="lt-LT" i="1" dirty="0" smtClean="0"/>
-              <a:t>Quartz.NET</a:t>
-            </a:r>
-            <a:endParaRPr lang="lt-LT" i="1" dirty="0"/>
-          </a:p>
-          <a:p>
-            <a:pPr lvl="1"/>
-            <a:r>
-              <a:rPr lang="lt-LT" dirty="0" smtClean="0"/>
-              <a:t>Sistemos tinklalapio puslapiai bei jiems reikalinga serverinė dalis</a:t>
-            </a:r>
-          </a:p>
-          <a:p>
-            <a:pPr lvl="1"/>
-            <a:r>
-              <a:rPr lang="lt-LT" dirty="0" smtClean="0"/>
-              <a:t>Vienetų bei integraciniai testai</a:t>
-            </a:r>
-          </a:p>
-          <a:p>
-            <a:pPr marL="514350" indent="-514350">
-              <a:buFont typeface="+mj-lt"/>
-              <a:buAutoNum type="arabicPeriod"/>
-            </a:pPr>
-            <a:r>
-              <a:rPr lang="lt-LT" dirty="0" smtClean="0"/>
-              <a:t>Sustiprintos programavimo žinios taikant bandytas bei dar nemėgintas technologijas (pvz. </a:t>
-            </a:r>
-            <a:r>
-              <a:rPr lang="lt-LT" i="1" dirty="0" smtClean="0"/>
-              <a:t>Angular</a:t>
-            </a:r>
-            <a:r>
-              <a:rPr lang="lt-LT" dirty="0" smtClean="0"/>
-              <a:t>, </a:t>
-            </a:r>
-            <a:r>
-              <a:rPr lang="lt-LT" i="1" dirty="0" smtClean="0"/>
-              <a:t>TypeScript</a:t>
-            </a:r>
-            <a:r>
-              <a:rPr lang="lt-LT" dirty="0" smtClean="0"/>
-              <a:t>, </a:t>
-            </a:r>
-            <a:r>
-              <a:rPr lang="lt-LT" i="1" dirty="0" smtClean="0"/>
-              <a:t>Gulp</a:t>
-            </a:r>
-            <a:r>
-              <a:rPr lang="lt-LT" dirty="0" smtClean="0"/>
-              <a:t>)</a:t>
-            </a:r>
-          </a:p>
-          <a:p>
-            <a:pPr marL="514350" indent="-514350">
-              <a:buFont typeface="+mj-lt"/>
-              <a:buAutoNum type="arabicPeriod"/>
-            </a:pPr>
-            <a:r>
-              <a:rPr lang="lt-LT" dirty="0" smtClean="0"/>
-              <a:t>Įgyta žinių, kaip naudotis nuolatinės integracijos priemonėmis (</a:t>
-            </a:r>
-            <a:r>
-              <a:rPr lang="lt-LT" i="1" dirty="0" smtClean="0"/>
-              <a:t>Octopus</a:t>
-            </a:r>
-            <a:r>
-              <a:rPr lang="lt-LT" dirty="0" smtClean="0"/>
-              <a:t>, </a:t>
-            </a:r>
-            <a:r>
-              <a:rPr lang="lt-LT" i="1" dirty="0" smtClean="0"/>
-              <a:t>Team Foundation Server</a:t>
-            </a:r>
-            <a:r>
-              <a:rPr lang="lt-LT" dirty="0" smtClean="0"/>
-              <a:t>) bei darbo organizavimo įrankiais (</a:t>
-            </a:r>
-            <a:r>
-              <a:rPr lang="lt-LT" i="1" dirty="0" smtClean="0"/>
-              <a:t>JIRA</a:t>
-            </a:r>
-            <a:r>
-              <a:rPr lang="lt-LT" dirty="0" smtClean="0"/>
-              <a:t>, </a:t>
-            </a:r>
-            <a:r>
-              <a:rPr lang="lt-LT" i="1" dirty="0" smtClean="0"/>
-              <a:t>Confluence</a:t>
-            </a:r>
-            <a:r>
-              <a:rPr lang="lt-LT" dirty="0" smtClean="0"/>
-              <a:t>)</a:t>
-            </a:r>
-          </a:p>
-          <a:p>
-            <a:pPr marL="514350" indent="-514350">
-              <a:buFont typeface="+mj-lt"/>
-              <a:buAutoNum type="arabicPeriod"/>
-            </a:pPr>
-            <a:r>
-              <a:rPr lang="lt-LT" dirty="0" smtClean="0"/>
-              <a:t>Įgauta patirties dirbant realiame projekte pagal judrųjį </a:t>
-            </a:r>
-            <a:r>
-              <a:rPr lang="lt-LT" i="1" dirty="0" smtClean="0"/>
-              <a:t>Kanban</a:t>
-            </a:r>
-            <a:r>
-              <a:rPr lang="lt-LT" dirty="0" smtClean="0"/>
-              <a:t> procesą</a:t>
-            </a:r>
-            <a:endParaRPr lang="lt-LT" dirty="0"/>
-          </a:p>
-        </p:txBody>
-      </p:sp>
-    </p:spTree>
-    <p:extLst>
-      <p:ext uri="{BB962C8B-B14F-4D97-AF65-F5344CB8AC3E}">
-        <p14:creationId xmlns:p14="http://schemas.microsoft.com/office/powerpoint/2010/main" val="4259306946"/>
+        <p14:creationId xmlns:p14="http://schemas.microsoft.com/office/powerpoint/2010/main" val="1184546887"/>
       </p:ext>
     </p:extLst>
   </p:cSld>

</xml_diff>